<commit_message>
fix heatmap color, update doc, slides
</commit_message>
<xml_diff>
--- a/midterm/heather_lemon_midterm.pptx
+++ b/midterm/heather_lemon_midterm.pptx
@@ -5,7 +5,7 @@
     <p:sldMasterId id="2147483648" r:id="rId1"/>
   </p:sldMasterIdLst>
   <p:notesMasterIdLst>
-    <p:notesMasterId r:id="rId18"/>
+    <p:notesMasterId r:id="rId19"/>
   </p:notesMasterIdLst>
   <p:sldIdLst>
     <p:sldId id="258" r:id="rId2"/>
@@ -16,14 +16,15 @@
     <p:sldId id="265" r:id="rId7"/>
     <p:sldId id="266" r:id="rId8"/>
     <p:sldId id="267" r:id="rId9"/>
-    <p:sldId id="268" r:id="rId10"/>
-    <p:sldId id="269" r:id="rId11"/>
-    <p:sldId id="275" r:id="rId12"/>
-    <p:sldId id="274" r:id="rId13"/>
+    <p:sldId id="275" r:id="rId10"/>
+    <p:sldId id="277" r:id="rId11"/>
+    <p:sldId id="274" r:id="rId12"/>
+    <p:sldId id="278" r:id="rId13"/>
     <p:sldId id="270" r:id="rId14"/>
-    <p:sldId id="271" r:id="rId15"/>
-    <p:sldId id="273" r:id="rId16"/>
-    <p:sldId id="276" r:id="rId17"/>
+    <p:sldId id="273" r:id="rId15"/>
+    <p:sldId id="269" r:id="rId16"/>
+    <p:sldId id="271" r:id="rId17"/>
+    <p:sldId id="276" r:id="rId18"/>
   </p:sldIdLst>
   <p:sldSz cx="12192000" cy="6858000"/>
   <p:notesSz cx="6858000" cy="9144000"/>
@@ -212,7 +213,7 @@
           <a:p>
             <a:fld id="{0899C1D7-0031-1541-AA63-7FAEC1216BBD}" type="datetimeFigureOut">
               <a:rPr lang="en-US" smtClean="0"/>
-              <a:t>3/31/2023</a:t>
+              <a:t>4/5/2023</a:t>
             </a:fld>
             <a:endParaRPr lang="en-US"/>
           </a:p>
@@ -7082,7 +7083,7 @@
           <a:p>
             <a:fld id="{D386965C-165C-764D-B490-A5796C92088F}" type="datetimeFigureOut">
               <a:rPr lang="en-US" smtClean="0"/>
-              <a:t>3/31/2023</a:t>
+              <a:t>4/5/2023</a:t>
             </a:fld>
             <a:endParaRPr lang="en-US"/>
           </a:p>
@@ -7584,6 +7585,14 @@
 <file path=ppt/slides/slide10.xml><?xml version="1.0" encoding="utf-8"?>
 <p:sld xmlns:a="http://schemas.openxmlformats.org/drawingml/2006/main" xmlns:r="http://schemas.openxmlformats.org/officeDocument/2006/relationships" xmlns:p="http://schemas.openxmlformats.org/presentationml/2006/main">
   <p:cSld>
+    <p:bg>
+      <p:bgPr>
+        <a:solidFill>
+          <a:schemeClr val="bg1"/>
+        </a:solidFill>
+        <a:effectLst/>
+      </p:bgPr>
+    </p:bg>
     <p:spTree>
       <p:nvGrpSpPr>
         <p:cNvPr id="1" name=""/>
@@ -7600,10 +7609,76 @@
       </p:grpSpPr>
       <p:sp>
         <p:nvSpPr>
+          <p:cNvPr id="11" name="Down Arrow 7">
+            <a:extLst>
+              <a:ext uri="{FF2B5EF4-FFF2-40B4-BE49-F238E27FC236}">
+                <a16:creationId xmlns:a16="http://schemas.microsoft.com/office/drawing/2014/main" id="{D4771268-CB57-404A-9271-370EB28F6090}"/>
+              </a:ext>
+              <a:ext uri="{C183D7F6-B498-43B3-948B-1728B52AA6E4}">
+                <adec:decorative xmlns:adec="http://schemas.microsoft.com/office/drawing/2017/decorative" val="1"/>
+              </a:ext>
+            </a:extLst>
+          </p:cNvPr>
+          <p:cNvSpPr>
+            <a:spLocks noGrp="1" noRot="1" noChangeAspect="1" noMove="1" noResize="1" noEditPoints="1" noAdjustHandles="1" noChangeArrowheads="1" noChangeShapeType="1" noTextEdit="1"/>
+          </p:cNvSpPr>
+          <p:nvPr>
+            <p:extLst>
+              <p:ext uri="{386F3935-93C4-4BCD-93E2-E3B085C9AB24}">
+                <p16:designElem xmlns:p16="http://schemas.microsoft.com/office/powerpoint/2015/main" val="1"/>
+              </p:ext>
+            </p:extLst>
+          </p:nvPr>
+        </p:nvSpPr>
+        <p:spPr>
+          <a:xfrm rot="16200000">
+            <a:off x="800100" y="1491343"/>
+            <a:ext cx="3333749" cy="3499103"/>
+          </a:xfrm>
+          <a:prstGeom prst="downArrow">
+            <a:avLst>
+              <a:gd name="adj1" fmla="val 100000"/>
+              <a:gd name="adj2" fmla="val 15788"/>
+            </a:avLst>
+          </a:prstGeom>
+          <a:solidFill>
+            <a:srgbClr val="404040"/>
+          </a:solidFill>
+          <a:ln w="53975">
+            <a:noFill/>
+          </a:ln>
+        </p:spPr>
+        <p:style>
+          <a:lnRef idx="2">
+            <a:schemeClr val="accent1">
+              <a:shade val="50000"/>
+            </a:schemeClr>
+          </a:lnRef>
+          <a:fillRef idx="1">
+            <a:schemeClr val="accent1"/>
+          </a:fillRef>
+          <a:effectRef idx="0">
+            <a:schemeClr val="accent1"/>
+          </a:effectRef>
+          <a:fontRef idx="minor">
+            <a:schemeClr val="lt1"/>
+          </a:fontRef>
+        </p:style>
+        <p:txBody>
+          <a:bodyPr rtlCol="0" anchor="ctr"/>
+          <a:lstStyle/>
+          <a:p>
+            <a:pPr algn="ctr"/>
+            <a:endParaRPr lang="en-US"/>
+          </a:p>
+        </p:txBody>
+      </p:sp>
+      <p:sp>
+        <p:nvSpPr>
           <p:cNvPr id="2" name="Title 1">
             <a:extLst>
               <a:ext uri="{FF2B5EF4-FFF2-40B4-BE49-F238E27FC236}">
-                <a16:creationId xmlns:a16="http://schemas.microsoft.com/office/drawing/2014/main" id="{73651502-26B8-2141-A3C9-CD6BEAF631CE}"/>
+                <a16:creationId xmlns:a16="http://schemas.microsoft.com/office/drawing/2014/main" id="{F6F8B694-0C90-CE32-B027-0FDD7110C93A}"/>
               </a:ext>
             </a:extLst>
           </p:cNvPr>
@@ -7614,32 +7689,44 @@
             <p:ph type="title"/>
           </p:nvPr>
         </p:nvSpPr>
-        <p:spPr/>
+        <p:spPr>
+          <a:xfrm>
+            <a:off x="1028700" y="1967266"/>
+            <a:ext cx="2628900" cy="2547257"/>
+          </a:xfrm>
+          <a:noFill/>
+        </p:spPr>
         <p:txBody>
-          <a:bodyPr/>
+          <a:bodyPr vert="horz" lIns="91440" tIns="45720" rIns="91440" bIns="45720" rtlCol="0" anchor="ctr">
+            <a:normAutofit/>
+          </a:bodyPr>
           <a:lstStyle/>
           <a:p>
-            <a:r>
-              <a:rPr lang="en-US" dirty="0"/>
-              <a:t>Explainable AI with </a:t>
-            </a:r>
-            <a:r>
-              <a:rPr lang="en-US" dirty="0" err="1"/>
-              <a:t>shap</a:t>
-            </a:r>
-            <a:r>
-              <a:rPr lang="en-US" dirty="0"/>
-              <a:t> package</a:t>
+            <a:pPr algn="ctr">
+              <a:lnSpc>
+                <a:spcPct val="90000"/>
+              </a:lnSpc>
+            </a:pPr>
+            <a:r>
+              <a:rPr lang="en-US" sz="3600" kern="1200">
+                <a:solidFill>
+                  <a:srgbClr val="FFFFFF"/>
+                </a:solidFill>
+                <a:latin typeface="+mj-lt"/>
+                <a:ea typeface="+mj-ea"/>
+                <a:cs typeface="+mj-cs"/>
+              </a:rPr>
+              <a:t>Model Selection Continued</a:t>
             </a:r>
           </a:p>
         </p:txBody>
       </p:sp>
       <p:pic>
         <p:nvPicPr>
-          <p:cNvPr id="6" name="Picture 5" descr="Chart&#10;&#10;Description automatically generated">
-            <a:extLst>
-              <a:ext uri="{FF2B5EF4-FFF2-40B4-BE49-F238E27FC236}">
-                <a16:creationId xmlns:a16="http://schemas.microsoft.com/office/drawing/2014/main" id="{1CC31AC4-AC8A-F745-0804-9983C589CE36}"/>
+          <p:cNvPr id="6" name="Picture 5" descr="Chart, bar chart, histogram&#10;&#10;Description automatically generated">
+            <a:extLst>
+              <a:ext uri="{FF2B5EF4-FFF2-40B4-BE49-F238E27FC236}">
+                <a16:creationId xmlns:a16="http://schemas.microsoft.com/office/drawing/2014/main" id="{07ED4E35-E93B-52B8-260E-96E996BE111C}"/>
               </a:ext>
             </a:extLst>
           </p:cNvPr>
@@ -7656,8 +7743,8 @@
         </p:blipFill>
         <p:spPr>
           <a:xfrm>
-            <a:off x="3124866" y="1609219"/>
-            <a:ext cx="4793235" cy="4978958"/>
+            <a:off x="5244113" y="854109"/>
+            <a:ext cx="6947887" cy="5888334"/>
           </a:xfrm>
           <a:prstGeom prst="rect">
             <a:avLst/>
@@ -7667,7 +7754,7 @@
     </p:spTree>
     <p:extLst>
       <p:ext uri="{BB962C8B-B14F-4D97-AF65-F5344CB8AC3E}">
-        <p14:creationId xmlns:p14="http://schemas.microsoft.com/office/powerpoint/2010/main" val="24590043"/>
+        <p14:creationId xmlns:p14="http://schemas.microsoft.com/office/powerpoint/2010/main" val="2089948446"/>
       </p:ext>
     </p:extLst>
   </p:cSld>
@@ -7699,7 +7786,7 @@
           <p:cNvPr id="2" name="Title 1">
             <a:extLst>
               <a:ext uri="{FF2B5EF4-FFF2-40B4-BE49-F238E27FC236}">
-                <a16:creationId xmlns:a16="http://schemas.microsoft.com/office/drawing/2014/main" id="{7ACA722E-133A-C14E-B940-93B32C189F31}"/>
+                <a16:creationId xmlns:a16="http://schemas.microsoft.com/office/drawing/2014/main" id="{81CA69EC-F1B5-22B8-6ABB-0865454D2CCD}"/>
               </a:ext>
             </a:extLst>
           </p:cNvPr>
@@ -7712,22 +7799,52 @@
         </p:nvSpPr>
         <p:spPr/>
         <p:txBody>
+          <a:bodyPr>
+            <a:normAutofit fontScale="90000"/>
+          </a:bodyPr>
+          <a:lstStyle/>
+          <a:p>
+            <a:r>
+              <a:rPr lang="en-US" dirty="0"/>
+              <a:t>Model Evaluation</a:t>
+            </a:r>
+          </a:p>
+        </p:txBody>
+      </p:sp>
+      <p:sp>
+        <p:nvSpPr>
+          <p:cNvPr id="4" name="Text Placeholder 3">
+            <a:extLst>
+              <a:ext uri="{FF2B5EF4-FFF2-40B4-BE49-F238E27FC236}">
+                <a16:creationId xmlns:a16="http://schemas.microsoft.com/office/drawing/2014/main" id="{920BFA18-D94A-37F5-EE77-E17015F9F15B}"/>
+              </a:ext>
+            </a:extLst>
+          </p:cNvPr>
+          <p:cNvSpPr>
+            <a:spLocks noGrp="1"/>
+          </p:cNvSpPr>
+          <p:nvPr>
+            <p:ph type="body" idx="11"/>
+          </p:nvPr>
+        </p:nvSpPr>
+        <p:spPr/>
+        <p:txBody>
           <a:bodyPr/>
           <a:lstStyle/>
           <a:p>
             <a:r>
               <a:rPr lang="en-US" dirty="0"/>
-              <a:t>Model Selection</a:t>
+              <a:t>Cross Validated Mean Accuracy Score</a:t>
             </a:r>
           </a:p>
         </p:txBody>
       </p:sp>
       <p:pic>
         <p:nvPicPr>
-          <p:cNvPr id="4" name="Picture 3" descr="Graphical user interface, application&#10;&#10;Description automatically generated with medium confidence">
-            <a:extLst>
-              <a:ext uri="{FF2B5EF4-FFF2-40B4-BE49-F238E27FC236}">
-                <a16:creationId xmlns:a16="http://schemas.microsoft.com/office/drawing/2014/main" id="{493F5431-B979-DA84-82A6-D721A5686133}"/>
+          <p:cNvPr id="5" name="Picture 4" descr="Graphical user interface&#10;&#10;Description automatically generated">
+            <a:extLst>
+              <a:ext uri="{FF2B5EF4-FFF2-40B4-BE49-F238E27FC236}">
+                <a16:creationId xmlns:a16="http://schemas.microsoft.com/office/drawing/2014/main" id="{03C18BCE-7EA3-661B-D419-DD68FCEA2D9E}"/>
               </a:ext>
             </a:extLst>
           </p:cNvPr>
@@ -7744,18 +7861,67 @@
         </p:blipFill>
         <p:spPr>
           <a:xfrm>
-            <a:off x="3315872" y="2086439"/>
-            <a:ext cx="4260584" cy="3716679"/>
+            <a:off x="3400230" y="3662557"/>
+            <a:ext cx="4753638" cy="1286054"/>
           </a:xfrm>
           <a:prstGeom prst="rect">
             <a:avLst/>
           </a:prstGeom>
         </p:spPr>
       </p:pic>
+      <p:sp>
+        <p:nvSpPr>
+          <p:cNvPr id="7" name="Text Placeholder 2">
+            <a:extLst>
+              <a:ext uri="{FF2B5EF4-FFF2-40B4-BE49-F238E27FC236}">
+                <a16:creationId xmlns:a16="http://schemas.microsoft.com/office/drawing/2014/main" id="{D68AA1D5-6C2C-5A64-3172-D3D7A80C37F5}"/>
+              </a:ext>
+            </a:extLst>
+          </p:cNvPr>
+          <p:cNvSpPr>
+            <a:spLocks noGrp="1"/>
+          </p:cNvSpPr>
+          <p:nvPr>
+            <p:ph type="body" idx="1"/>
+          </p:nvPr>
+        </p:nvSpPr>
+        <p:spPr>
+          <a:xfrm>
+            <a:off x="711929" y="1672180"/>
+            <a:ext cx="10130241" cy="1905033"/>
+          </a:xfrm>
+        </p:spPr>
+        <p:txBody>
+          <a:bodyPr/>
+          <a:lstStyle/>
+          <a:p>
+            <a:pPr>
+              <a:lnSpc>
+                <a:spcPct val="100000"/>
+              </a:lnSpc>
+            </a:pPr>
+            <a:r>
+              <a:rPr lang="en-US" dirty="0"/>
+              <a:t>Select the top three performing models via accuracy and </a:t>
+            </a:r>
+          </a:p>
+          <a:p>
+            <a:pPr>
+              <a:lnSpc>
+                <a:spcPct val="100000"/>
+              </a:lnSpc>
+            </a:pPr>
+            <a:r>
+              <a:rPr lang="en-US" dirty="0"/>
+              <a:t>Run a cross validated mean accuracy score. The result is the same for all three models. </a:t>
+            </a:r>
+          </a:p>
+        </p:txBody>
+      </p:sp>
     </p:spTree>
     <p:extLst>
       <p:ext uri="{BB962C8B-B14F-4D97-AF65-F5344CB8AC3E}">
-        <p14:creationId xmlns:p14="http://schemas.microsoft.com/office/powerpoint/2010/main" val="1233587953"/>
+        <p14:creationId xmlns:p14="http://schemas.microsoft.com/office/powerpoint/2010/main" val="3978180021"/>
       </p:ext>
     </p:extLst>
   </p:cSld>
@@ -7787,7 +7953,7 @@
           <p:cNvPr id="2" name="Title 1">
             <a:extLst>
               <a:ext uri="{FF2B5EF4-FFF2-40B4-BE49-F238E27FC236}">
-                <a16:creationId xmlns:a16="http://schemas.microsoft.com/office/drawing/2014/main" id="{81CA69EC-F1B5-22B8-6ABB-0865454D2CCD}"/>
+                <a16:creationId xmlns:a16="http://schemas.microsoft.com/office/drawing/2014/main" id="{330546F8-E18D-52FB-58B3-D03D86D3B758}"/>
               </a:ext>
             </a:extLst>
           </p:cNvPr>
@@ -7806,8 +7972,48 @@
           <a:lstStyle/>
           <a:p>
             <a:r>
+              <a:rPr lang="en-US" dirty="0" err="1"/>
+              <a:t>HyperParameter</a:t>
+            </a:r>
+            <a:r>
               <a:rPr lang="en-US" dirty="0"/>
-              <a:t>Model Evaluation</a:t>
+              <a:t> Tuning</a:t>
+            </a:r>
+          </a:p>
+        </p:txBody>
+      </p:sp>
+      <p:sp>
+        <p:nvSpPr>
+          <p:cNvPr id="3" name="Text Placeholder 2">
+            <a:extLst>
+              <a:ext uri="{FF2B5EF4-FFF2-40B4-BE49-F238E27FC236}">
+                <a16:creationId xmlns:a16="http://schemas.microsoft.com/office/drawing/2014/main" id="{9D953DAE-FB0D-410E-2261-447D3E04B4BB}"/>
+              </a:ext>
+            </a:extLst>
+          </p:cNvPr>
+          <p:cNvSpPr>
+            <a:spLocks noGrp="1"/>
+          </p:cNvSpPr>
+          <p:nvPr>
+            <p:ph type="body" idx="1"/>
+          </p:nvPr>
+        </p:nvSpPr>
+        <p:spPr/>
+        <p:txBody>
+          <a:bodyPr/>
+          <a:lstStyle/>
+          <a:p>
+            <a:r>
+              <a:rPr lang="en-US" dirty="0"/>
+              <a:t>I selected the top two models, Decision Tree Regressor and Random Forest Regressor model, ran </a:t>
+            </a:r>
+            <a:r>
+              <a:rPr lang="en-US" dirty="0" err="1"/>
+              <a:t>GridSearchCV</a:t>
+            </a:r>
+            <a:r>
+              <a:rPr lang="en-US" dirty="0"/>
+              <a:t> and found no performance gains when running the training set data with optimal parameter settings. </a:t>
             </a:r>
           </a:p>
         </p:txBody>
@@ -7817,7 +8023,7 @@
           <p:cNvPr id="4" name="Text Placeholder 3">
             <a:extLst>
               <a:ext uri="{FF2B5EF4-FFF2-40B4-BE49-F238E27FC236}">
-                <a16:creationId xmlns:a16="http://schemas.microsoft.com/office/drawing/2014/main" id="{920BFA18-D94A-37F5-EE77-E17015F9F15B}"/>
+                <a16:creationId xmlns:a16="http://schemas.microsoft.com/office/drawing/2014/main" id="{C5F33880-A866-D823-FF29-4CEEAC8C1A3E}"/>
               </a:ext>
             </a:extLst>
           </p:cNvPr>
@@ -7833,47 +8039,14 @@
           <a:bodyPr/>
           <a:lstStyle/>
           <a:p>
-            <a:r>
-              <a:rPr lang="en-US" dirty="0"/>
-              <a:t>Cross Validated Mean Accuracy Score</a:t>
-            </a:r>
+            <a:endParaRPr lang="en-US" dirty="0"/>
           </a:p>
         </p:txBody>
       </p:sp>
-      <p:pic>
-        <p:nvPicPr>
-          <p:cNvPr id="6" name="Picture 5" descr="Graphical user interface&#10;&#10;Description automatically generated">
-            <a:extLst>
-              <a:ext uri="{FF2B5EF4-FFF2-40B4-BE49-F238E27FC236}">
-                <a16:creationId xmlns:a16="http://schemas.microsoft.com/office/drawing/2014/main" id="{BCA9F02E-2554-ECC9-0844-89DBE0162EC8}"/>
-              </a:ext>
-            </a:extLst>
-          </p:cNvPr>
-          <p:cNvPicPr>
-            <a:picLocks noChangeAspect="1"/>
-          </p:cNvPicPr>
-          <p:nvPr/>
-        </p:nvPicPr>
-        <p:blipFill>
-          <a:blip r:embed="rId2"/>
-          <a:stretch>
-            <a:fillRect/>
-          </a:stretch>
-        </p:blipFill>
-        <p:spPr>
-          <a:xfrm>
-            <a:off x="1921570" y="2280976"/>
-            <a:ext cx="6942770" cy="1752946"/>
-          </a:xfrm>
-          <a:prstGeom prst="rect">
-            <a:avLst/>
-          </a:prstGeom>
-        </p:spPr>
-      </p:pic>
     </p:spTree>
     <p:extLst>
       <p:ext uri="{BB962C8B-B14F-4D97-AF65-F5344CB8AC3E}">
-        <p14:creationId xmlns:p14="http://schemas.microsoft.com/office/powerpoint/2010/main" val="3978180021"/>
+        <p14:creationId xmlns:p14="http://schemas.microsoft.com/office/powerpoint/2010/main" val="2450242446"/>
       </p:ext>
     </p:extLst>
   </p:cSld>
@@ -7944,29 +8117,57 @@
             <p:ph type="body" idx="1"/>
           </p:nvPr>
         </p:nvSpPr>
-        <p:spPr/>
+        <p:spPr>
+          <a:xfrm>
+            <a:off x="711929" y="1672180"/>
+            <a:ext cx="6884625" cy="4079696"/>
+          </a:xfrm>
+        </p:spPr>
         <p:txBody>
           <a:bodyPr/>
           <a:lstStyle/>
           <a:p>
             <a:r>
-              <a:rPr lang="pt-BR" b="0" i="0" dirty="0">
+              <a:rPr lang="en-US" dirty="0">
                 <a:solidFill>
                   <a:schemeClr val="tx2"/>
                 </a:solidFill>
-                <a:effectLst/>
-                <a:latin typeface="Consolas" panose="020B0609020204030204" pitchFamily="49" charset="0"/>
               </a:rPr>
-              <a:t>Final Scores: R2 Score: 0.98 MSE: 0.02 RMSE: 0.13</a:t>
-            </a:r>
-            <a:endParaRPr lang="en-US" dirty="0">
-              <a:solidFill>
-                <a:schemeClr val="tx2"/>
-              </a:solidFill>
-            </a:endParaRPr>
+              <a:t>With running the test dataset. Acousticness was the top predictor in determining a songs popularity which also follows the outputs we got from the training data.</a:t>
+            </a:r>
           </a:p>
         </p:txBody>
       </p:sp>
+      <p:pic>
+        <p:nvPicPr>
+          <p:cNvPr id="5" name="Picture 4" descr="Graphical user interface, application&#10;&#10;Description automatically generated">
+            <a:extLst>
+              <a:ext uri="{FF2B5EF4-FFF2-40B4-BE49-F238E27FC236}">
+                <a16:creationId xmlns:a16="http://schemas.microsoft.com/office/drawing/2014/main" id="{92041B07-8E25-430A-94F9-1054B8910087}"/>
+              </a:ext>
+            </a:extLst>
+          </p:cNvPr>
+          <p:cNvPicPr>
+            <a:picLocks noChangeAspect="1"/>
+          </p:cNvPicPr>
+          <p:nvPr/>
+        </p:nvPicPr>
+        <p:blipFill>
+          <a:blip r:embed="rId2"/>
+          <a:stretch>
+            <a:fillRect/>
+          </a:stretch>
+        </p:blipFill>
+        <p:spPr>
+          <a:xfrm>
+            <a:off x="8324128" y="1740078"/>
+            <a:ext cx="2838846" cy="3943900"/>
+          </a:xfrm>
+          <a:prstGeom prst="rect">
+            <a:avLst/>
+          </a:prstGeom>
+        </p:spPr>
+      </p:pic>
     </p:spTree>
     <p:extLst>
       <p:ext uri="{BB962C8B-B14F-4D97-AF65-F5344CB8AC3E}">
@@ -8002,7 +8203,7 @@
           <p:cNvPr id="2" name="Title 1">
             <a:extLst>
               <a:ext uri="{FF2B5EF4-FFF2-40B4-BE49-F238E27FC236}">
-                <a16:creationId xmlns:a16="http://schemas.microsoft.com/office/drawing/2014/main" id="{B8684E65-9272-6945-9928-8DDC1F33474D}"/>
+                <a16:creationId xmlns:a16="http://schemas.microsoft.com/office/drawing/2014/main" id="{BF70BEA6-6A0D-C64A-BD71-FFD27AA560FE}"/>
               </a:ext>
             </a:extLst>
           </p:cNvPr>
@@ -8013,67 +8214,24 @@
             <p:ph type="title"/>
           </p:nvPr>
         </p:nvSpPr>
-        <p:spPr>
-          <a:xfrm>
-            <a:off x="1224394" y="648041"/>
-            <a:ext cx="10635521" cy="1024139"/>
-          </a:xfrm>
-        </p:spPr>
+        <p:spPr/>
         <p:txBody>
-          <a:bodyPr>
-            <a:normAutofit fontScale="90000"/>
-          </a:bodyPr>
+          <a:bodyPr/>
           <a:lstStyle/>
           <a:p>
             <a:r>
-              <a:rPr lang="en-US" b="1" dirty="0">
-                <a:solidFill>
-                  <a:srgbClr val="569CD6"/>
-                </a:solidFill>
-                <a:effectLst/>
-                <a:latin typeface="Consolas" panose="020B0609020204030204" pitchFamily="49" charset="0"/>
-              </a:rPr>
-              <a:t> </a:t>
-            </a:r>
-            <a:r>
-              <a:rPr lang="en-US" b="1" dirty="0">
-                <a:solidFill>
-                  <a:schemeClr val="tx2"/>
-                </a:solidFill>
-                <a:effectLst/>
-                <a:latin typeface="Consolas" panose="020B0609020204030204" pitchFamily="49" charset="0"/>
-              </a:rPr>
-              <a:t>Surprise! Explainable machine learning with </a:t>
-            </a:r>
-            <a:r>
-              <a:rPr lang="en-US" b="1" dirty="0" err="1">
-                <a:solidFill>
-                  <a:schemeClr val="tx2"/>
-                </a:solidFill>
-                <a:effectLst/>
-                <a:latin typeface="Consolas" panose="020B0609020204030204" pitchFamily="49" charset="0"/>
-              </a:rPr>
-              <a:t>explainerdashboard</a:t>
-            </a:r>
-            <a:br>
-              <a:rPr lang="en-US" b="0" dirty="0">
-                <a:solidFill>
-                  <a:srgbClr val="D4D4D4"/>
-                </a:solidFill>
-                <a:effectLst/>
-                <a:latin typeface="Consolas" panose="020B0609020204030204" pitchFamily="49" charset="0"/>
-              </a:rPr>
-            </a:br>
-            <a:endParaRPr lang="en-US" dirty="0"/>
+              <a:rPr lang="en-US" dirty="0"/>
+              <a:t>Conclusion</a:t>
+            </a:r>
           </a:p>
         </p:txBody>
       </p:sp>
       <p:sp>
         <p:nvSpPr>
-          <p:cNvPr id="3" name="Text Placeholder 2">
-            <a:extLst>
-              <a:ext uri="{FF2B5EF4-FFF2-40B4-BE49-F238E27FC236}">
-                <a16:creationId xmlns:a16="http://schemas.microsoft.com/office/drawing/2014/main" id="{916DA5DB-DC22-ED42-B003-05BA467F9C00}"/>
+          <p:cNvPr id="4" name="Text Placeholder 3">
+            <a:extLst>
+              <a:ext uri="{FF2B5EF4-FFF2-40B4-BE49-F238E27FC236}">
+                <a16:creationId xmlns:a16="http://schemas.microsoft.com/office/drawing/2014/main" id="{F40A9A4C-FCFA-754C-9375-C8E7F863AB67}"/>
               </a:ext>
             </a:extLst>
           </p:cNvPr>
@@ -8081,13 +8239,13 @@
             <a:spLocks noGrp="1"/>
           </p:cNvSpPr>
           <p:nvPr>
-            <p:ph type="body" idx="1"/>
+            <p:ph type="body" idx="10"/>
           </p:nvPr>
         </p:nvSpPr>
         <p:spPr>
           <a:xfrm>
-            <a:off x="711929" y="1672180"/>
-            <a:ext cx="9446955" cy="4079696"/>
+            <a:off x="1667951" y="1389152"/>
+            <a:ext cx="8723474" cy="4079696"/>
           </a:xfrm>
         </p:spPr>
         <p:txBody>
@@ -8095,8 +8253,12 @@
           <a:lstStyle/>
           <a:p>
             <a:r>
-              <a:rPr lang="en-US" dirty="0"/>
-              <a:t>See browser tab</a:t>
+              <a:rPr lang="en-US" dirty="0">
+                <a:solidFill>
+                  <a:schemeClr val="tx2"/>
+                </a:solidFill>
+              </a:rPr>
+              <a:t>In conclusion with the results from the modeling we don’t have strong evidence to suggest that the features listed from a song play an important factor when a song is chosen for its popularity, we are no better than guessing and it’s mostly likely due to underfitting where we cannot capture the relationship properly between the inputs and outputs accurately. If we were to include the popularity field from Spotify as our target, the results would have been better. It was interesting to see what models predicted its own feature importance.</a:t>
             </a:r>
           </a:p>
         </p:txBody>
@@ -8104,7 +8266,7 @@
     </p:spTree>
     <p:extLst>
       <p:ext uri="{BB962C8B-B14F-4D97-AF65-F5344CB8AC3E}">
-        <p14:creationId xmlns:p14="http://schemas.microsoft.com/office/powerpoint/2010/main" val="4160229133"/>
+        <p14:creationId xmlns:p14="http://schemas.microsoft.com/office/powerpoint/2010/main" val="4051248754"/>
       </p:ext>
     </p:extLst>
   </p:cSld>
@@ -8136,7 +8298,7 @@
           <p:cNvPr id="2" name="Title 1">
             <a:extLst>
               <a:ext uri="{FF2B5EF4-FFF2-40B4-BE49-F238E27FC236}">
-                <a16:creationId xmlns:a16="http://schemas.microsoft.com/office/drawing/2014/main" id="{BF70BEA6-6A0D-C64A-BD71-FFD27AA560FE}"/>
+                <a16:creationId xmlns:a16="http://schemas.microsoft.com/office/drawing/2014/main" id="{73651502-26B8-2141-A3C9-CD6BEAF631CE}"/>
               </a:ext>
             </a:extLst>
           </p:cNvPr>
@@ -8154,63 +8316,53 @@
           <a:p>
             <a:r>
               <a:rPr lang="en-US" dirty="0"/>
-              <a:t>Conclusion</a:t>
+              <a:t>Explainable AI with </a:t>
+            </a:r>
+            <a:r>
+              <a:rPr lang="en-US" dirty="0" err="1"/>
+              <a:t>shap</a:t>
+            </a:r>
+            <a:r>
+              <a:rPr lang="en-US" dirty="0"/>
+              <a:t> package</a:t>
             </a:r>
           </a:p>
         </p:txBody>
       </p:sp>
-      <p:sp>
-        <p:nvSpPr>
-          <p:cNvPr id="4" name="Text Placeholder 3">
-            <a:extLst>
-              <a:ext uri="{FF2B5EF4-FFF2-40B4-BE49-F238E27FC236}">
-                <a16:creationId xmlns:a16="http://schemas.microsoft.com/office/drawing/2014/main" id="{F40A9A4C-FCFA-754C-9375-C8E7F863AB67}"/>
-              </a:ext>
-            </a:extLst>
-          </p:cNvPr>
-          <p:cNvSpPr>
-            <a:spLocks noGrp="1"/>
-          </p:cNvSpPr>
-          <p:nvPr>
-            <p:ph type="body" idx="10"/>
-          </p:nvPr>
-        </p:nvSpPr>
-        <p:spPr/>
-        <p:txBody>
-          <a:bodyPr/>
-          <a:lstStyle/>
-          <a:p>
-            <a:r>
-              <a:rPr lang="en-US" dirty="0">
-                <a:solidFill>
-                  <a:schemeClr val="tx2"/>
-                </a:solidFill>
-              </a:rPr>
-              <a:t>In conclusion with the results from the model including what </a:t>
-            </a:r>
-            <a:r>
-              <a:rPr lang="en-US" dirty="0" err="1">
-                <a:solidFill>
-                  <a:schemeClr val="tx2"/>
-                </a:solidFill>
-              </a:rPr>
-              <a:t>explainerdashboard</a:t>
-            </a:r>
-            <a:r>
-              <a:rPr lang="en-US" dirty="0">
-                <a:solidFill>
-                  <a:schemeClr val="tx2"/>
-                </a:solidFill>
-              </a:rPr>
-              <a:t> provides the number of Streams is by far the most important factor in determining if a song is popular. The other important features include month the song came out and energy levels. </a:t>
-            </a:r>
-          </a:p>
-        </p:txBody>
-      </p:sp>
+      <p:pic>
+        <p:nvPicPr>
+          <p:cNvPr id="6" name="Picture 5" descr="Chart&#10;&#10;Description automatically generated">
+            <a:extLst>
+              <a:ext uri="{FF2B5EF4-FFF2-40B4-BE49-F238E27FC236}">
+                <a16:creationId xmlns:a16="http://schemas.microsoft.com/office/drawing/2014/main" id="{1CC31AC4-AC8A-F745-0804-9983C589CE36}"/>
+              </a:ext>
+            </a:extLst>
+          </p:cNvPr>
+          <p:cNvPicPr>
+            <a:picLocks noChangeAspect="1"/>
+          </p:cNvPicPr>
+          <p:nvPr/>
+        </p:nvPicPr>
+        <p:blipFill>
+          <a:blip r:embed="rId2"/>
+          <a:stretch>
+            <a:fillRect/>
+          </a:stretch>
+        </p:blipFill>
+        <p:spPr>
+          <a:xfrm>
+            <a:off x="3124866" y="1609219"/>
+            <a:ext cx="4793235" cy="4978958"/>
+          </a:xfrm>
+          <a:prstGeom prst="rect">
+            <a:avLst/>
+          </a:prstGeom>
+        </p:spPr>
+      </p:pic>
     </p:spTree>
     <p:extLst>
       <p:ext uri="{BB962C8B-B14F-4D97-AF65-F5344CB8AC3E}">
-        <p14:creationId xmlns:p14="http://schemas.microsoft.com/office/powerpoint/2010/main" val="4051248754"/>
+        <p14:creationId xmlns:p14="http://schemas.microsoft.com/office/powerpoint/2010/main" val="24590043"/>
       </p:ext>
     </p:extLst>
   </p:cSld>
@@ -8242,6 +8394,140 @@
           <p:cNvPr id="2" name="Title 1">
             <a:extLst>
               <a:ext uri="{FF2B5EF4-FFF2-40B4-BE49-F238E27FC236}">
+                <a16:creationId xmlns:a16="http://schemas.microsoft.com/office/drawing/2014/main" id="{B8684E65-9272-6945-9928-8DDC1F33474D}"/>
+              </a:ext>
+            </a:extLst>
+          </p:cNvPr>
+          <p:cNvSpPr>
+            <a:spLocks noGrp="1"/>
+          </p:cNvSpPr>
+          <p:nvPr>
+            <p:ph type="title"/>
+          </p:nvPr>
+        </p:nvSpPr>
+        <p:spPr>
+          <a:xfrm>
+            <a:off x="1224394" y="648041"/>
+            <a:ext cx="10635521" cy="1024139"/>
+          </a:xfrm>
+        </p:spPr>
+        <p:txBody>
+          <a:bodyPr>
+            <a:normAutofit fontScale="90000"/>
+          </a:bodyPr>
+          <a:lstStyle/>
+          <a:p>
+            <a:r>
+              <a:rPr lang="en-US" b="1" dirty="0">
+                <a:solidFill>
+                  <a:srgbClr val="569CD6"/>
+                </a:solidFill>
+                <a:effectLst/>
+                <a:latin typeface="Consolas" panose="020B0609020204030204" pitchFamily="49" charset="0"/>
+              </a:rPr>
+              <a:t> </a:t>
+            </a:r>
+            <a:r>
+              <a:rPr lang="en-US" b="1" dirty="0">
+                <a:solidFill>
+                  <a:schemeClr val="tx2"/>
+                </a:solidFill>
+                <a:effectLst/>
+                <a:latin typeface="Consolas" panose="020B0609020204030204" pitchFamily="49" charset="0"/>
+              </a:rPr>
+              <a:t>Surprise! Explainable machine learning with </a:t>
+            </a:r>
+            <a:r>
+              <a:rPr lang="en-US" b="1" dirty="0" err="1">
+                <a:solidFill>
+                  <a:schemeClr val="tx2"/>
+                </a:solidFill>
+                <a:effectLst/>
+                <a:latin typeface="Consolas" panose="020B0609020204030204" pitchFamily="49" charset="0"/>
+              </a:rPr>
+              <a:t>explainerdashboard</a:t>
+            </a:r>
+            <a:br>
+              <a:rPr lang="en-US" b="0" dirty="0">
+                <a:solidFill>
+                  <a:srgbClr val="D4D4D4"/>
+                </a:solidFill>
+                <a:effectLst/>
+                <a:latin typeface="Consolas" panose="020B0609020204030204" pitchFamily="49" charset="0"/>
+              </a:rPr>
+            </a:br>
+            <a:endParaRPr lang="en-US" dirty="0"/>
+          </a:p>
+        </p:txBody>
+      </p:sp>
+      <p:sp>
+        <p:nvSpPr>
+          <p:cNvPr id="3" name="Text Placeholder 2">
+            <a:extLst>
+              <a:ext uri="{FF2B5EF4-FFF2-40B4-BE49-F238E27FC236}">
+                <a16:creationId xmlns:a16="http://schemas.microsoft.com/office/drawing/2014/main" id="{916DA5DB-DC22-ED42-B003-05BA467F9C00}"/>
+              </a:ext>
+            </a:extLst>
+          </p:cNvPr>
+          <p:cNvSpPr>
+            <a:spLocks noGrp="1"/>
+          </p:cNvSpPr>
+          <p:nvPr>
+            <p:ph type="body" idx="1"/>
+          </p:nvPr>
+        </p:nvSpPr>
+        <p:spPr>
+          <a:xfrm>
+            <a:off x="711929" y="1672180"/>
+            <a:ext cx="9446955" cy="4079696"/>
+          </a:xfrm>
+        </p:spPr>
+        <p:txBody>
+          <a:bodyPr/>
+          <a:lstStyle/>
+          <a:p>
+            <a:r>
+              <a:rPr lang="en-US" dirty="0"/>
+              <a:t>See browser tab</a:t>
+            </a:r>
+          </a:p>
+        </p:txBody>
+      </p:sp>
+    </p:spTree>
+    <p:extLst>
+      <p:ext uri="{BB962C8B-B14F-4D97-AF65-F5344CB8AC3E}">
+        <p14:creationId xmlns:p14="http://schemas.microsoft.com/office/powerpoint/2010/main" val="4160229133"/>
+      </p:ext>
+    </p:extLst>
+  </p:cSld>
+  <p:clrMapOvr>
+    <a:masterClrMapping/>
+  </p:clrMapOvr>
+</p:sld>
+</file>
+
+<file path=ppt/slides/slide17.xml><?xml version="1.0" encoding="utf-8"?>
+<p:sld xmlns:a="http://schemas.openxmlformats.org/drawingml/2006/main" xmlns:r="http://schemas.openxmlformats.org/officeDocument/2006/relationships" xmlns:p="http://schemas.openxmlformats.org/presentationml/2006/main">
+  <p:cSld>
+    <p:spTree>
+      <p:nvGrpSpPr>
+        <p:cNvPr id="1" name=""/>
+        <p:cNvGrpSpPr/>
+        <p:nvPr/>
+      </p:nvGrpSpPr>
+      <p:grpSpPr>
+        <a:xfrm>
+          <a:off x="0" y="0"/>
+          <a:ext cx="0" cy="0"/>
+          <a:chOff x="0" y="0"/>
+          <a:chExt cx="0" cy="0"/>
+        </a:xfrm>
+      </p:grpSpPr>
+      <p:sp>
+        <p:nvSpPr>
+          <p:cNvPr id="2" name="Title 1">
+            <a:extLst>
+              <a:ext uri="{FF2B5EF4-FFF2-40B4-BE49-F238E27FC236}">
                 <a16:creationId xmlns:a16="http://schemas.microsoft.com/office/drawing/2014/main" id="{ED970741-9744-095D-32F9-214E27F4B461}"/>
               </a:ext>
             </a:extLst>
@@ -8283,7 +8569,7 @@
         </p:nvSpPr>
         <p:spPr>
           <a:xfrm>
-            <a:off x="711928" y="1672180"/>
+            <a:off x="711928" y="1475367"/>
             <a:ext cx="6603272" cy="3070642"/>
           </a:xfrm>
         </p:spPr>
@@ -8826,6 +9112,14 @@
 <file path=ppt/slides/slide6.xml><?xml version="1.0" encoding="utf-8"?>
 <p:sld xmlns:a="http://schemas.openxmlformats.org/drawingml/2006/main" xmlns:r="http://schemas.openxmlformats.org/officeDocument/2006/relationships" xmlns:p="http://schemas.openxmlformats.org/presentationml/2006/main">
   <p:cSld>
+    <p:bg>
+      <p:bgPr>
+        <a:solidFill>
+          <a:schemeClr val="bg1"/>
+        </a:solidFill>
+        <a:effectLst/>
+      </p:bgPr>
+    </p:bg>
     <p:spTree>
       <p:nvGrpSpPr>
         <p:cNvPr id="1" name=""/>
@@ -8842,6 +9136,72 @@
       </p:grpSpPr>
       <p:sp>
         <p:nvSpPr>
+          <p:cNvPr id="14" name="Down Arrow 7">
+            <a:extLst>
+              <a:ext uri="{FF2B5EF4-FFF2-40B4-BE49-F238E27FC236}">
+                <a16:creationId xmlns:a16="http://schemas.microsoft.com/office/drawing/2014/main" id="{D4771268-CB57-404A-9271-370EB28F6090}"/>
+              </a:ext>
+              <a:ext uri="{C183D7F6-B498-43B3-948B-1728B52AA6E4}">
+                <adec:decorative xmlns:adec="http://schemas.microsoft.com/office/drawing/2017/decorative" val="1"/>
+              </a:ext>
+            </a:extLst>
+          </p:cNvPr>
+          <p:cNvSpPr>
+            <a:spLocks noGrp="1" noRot="1" noChangeAspect="1" noMove="1" noResize="1" noEditPoints="1" noAdjustHandles="1" noChangeArrowheads="1" noChangeShapeType="1" noTextEdit="1"/>
+          </p:cNvSpPr>
+          <p:nvPr>
+            <p:extLst>
+              <p:ext uri="{386F3935-93C4-4BCD-93E2-E3B085C9AB24}">
+                <p16:designElem xmlns:p16="http://schemas.microsoft.com/office/powerpoint/2015/main" val="1"/>
+              </p:ext>
+            </p:extLst>
+          </p:nvPr>
+        </p:nvSpPr>
+        <p:spPr>
+          <a:xfrm rot="16200000">
+            <a:off x="800100" y="1491343"/>
+            <a:ext cx="3333749" cy="3499103"/>
+          </a:xfrm>
+          <a:prstGeom prst="downArrow">
+            <a:avLst>
+              <a:gd name="adj1" fmla="val 100000"/>
+              <a:gd name="adj2" fmla="val 15788"/>
+            </a:avLst>
+          </a:prstGeom>
+          <a:solidFill>
+            <a:srgbClr val="404040"/>
+          </a:solidFill>
+          <a:ln w="53975">
+            <a:noFill/>
+          </a:ln>
+        </p:spPr>
+        <p:style>
+          <a:lnRef idx="2">
+            <a:schemeClr val="accent1">
+              <a:shade val="50000"/>
+            </a:schemeClr>
+          </a:lnRef>
+          <a:fillRef idx="1">
+            <a:schemeClr val="accent1"/>
+          </a:fillRef>
+          <a:effectRef idx="0">
+            <a:schemeClr val="accent1"/>
+          </a:effectRef>
+          <a:fontRef idx="minor">
+            <a:schemeClr val="lt1"/>
+          </a:fontRef>
+        </p:style>
+        <p:txBody>
+          <a:bodyPr rtlCol="0" anchor="ctr"/>
+          <a:lstStyle/>
+          <a:p>
+            <a:pPr algn="ctr"/>
+            <a:endParaRPr lang="en-US"/>
+          </a:p>
+        </p:txBody>
+      </p:sp>
+      <p:sp>
+        <p:nvSpPr>
           <p:cNvPr id="6" name="Title 5">
             <a:extLst>
               <a:ext uri="{FF2B5EF4-FFF2-40B4-BE49-F238E27FC236}">
@@ -8856,51 +9216,44 @@
             <p:ph type="title"/>
           </p:nvPr>
         </p:nvSpPr>
-        <p:spPr/>
+        <p:spPr>
+          <a:xfrm>
+            <a:off x="1028700" y="1967266"/>
+            <a:ext cx="2628900" cy="2547257"/>
+          </a:xfrm>
+          <a:noFill/>
+        </p:spPr>
         <p:txBody>
-          <a:bodyPr>
-            <a:normAutofit fontScale="90000"/>
+          <a:bodyPr vert="horz" lIns="91440" tIns="45720" rIns="91440" bIns="45720" rtlCol="0" anchor="ctr">
+            <a:normAutofit/>
           </a:bodyPr>
           <a:lstStyle/>
           <a:p>
-            <a:r>
-              <a:rPr lang="en-US" dirty="0"/>
+            <a:pPr algn="ctr">
+              <a:lnSpc>
+                <a:spcPct val="90000"/>
+              </a:lnSpc>
+            </a:pPr>
+            <a:r>
+              <a:rPr lang="en-US" sz="3600" kern="1200">
+                <a:solidFill>
+                  <a:srgbClr val="FFFFFF"/>
+                </a:solidFill>
+                <a:latin typeface="+mj-lt"/>
+                <a:ea typeface="+mj-ea"/>
+                <a:cs typeface="+mj-cs"/>
+              </a:rPr>
               <a:t>Correlation Plot</a:t>
             </a:r>
-          </a:p>
-        </p:txBody>
-      </p:sp>
-      <p:sp>
-        <p:nvSpPr>
-          <p:cNvPr id="9" name="Text Placeholder 8">
-            <a:extLst>
-              <a:ext uri="{FF2B5EF4-FFF2-40B4-BE49-F238E27FC236}">
-                <a16:creationId xmlns:a16="http://schemas.microsoft.com/office/drawing/2014/main" id="{A862E861-6D6E-A7EA-01A0-E7AA0DA9952A}"/>
-              </a:ext>
-            </a:extLst>
-          </p:cNvPr>
-          <p:cNvSpPr>
-            <a:spLocks noGrp="1"/>
-          </p:cNvSpPr>
-          <p:nvPr>
-            <p:ph type="body" idx="11"/>
-          </p:nvPr>
-        </p:nvSpPr>
-        <p:spPr/>
-        <p:txBody>
-          <a:bodyPr/>
-          <a:lstStyle/>
-          <a:p>
-            <a:endParaRPr lang="en-US"/>
           </a:p>
         </p:txBody>
       </p:sp>
       <p:pic>
         <p:nvPicPr>
-          <p:cNvPr id="11" name="Picture 10">
-            <a:extLst>
-              <a:ext uri="{FF2B5EF4-FFF2-40B4-BE49-F238E27FC236}">
-                <a16:creationId xmlns:a16="http://schemas.microsoft.com/office/drawing/2014/main" id="{6B8FABDE-4207-1C0B-AA86-FB9CA1E7CEB8}"/>
+          <p:cNvPr id="3" name="Picture 2">
+            <a:extLst>
+              <a:ext uri="{FF2B5EF4-FFF2-40B4-BE49-F238E27FC236}">
+                <a16:creationId xmlns:a16="http://schemas.microsoft.com/office/drawing/2014/main" id="{7F867B7B-9774-7340-3FF3-61382F53A248}"/>
               </a:ext>
             </a:extLst>
           </p:cNvPr>
@@ -8917,8 +9270,8 @@
         </p:blipFill>
         <p:spPr>
           <a:xfrm>
-            <a:off x="2951576" y="1778558"/>
-            <a:ext cx="5575800" cy="4968910"/>
+            <a:off x="4783016" y="258859"/>
+            <a:ext cx="7264958" cy="6465813"/>
           </a:xfrm>
           <a:prstGeom prst="rect">
             <a:avLst/>
@@ -8983,12 +9336,123 @@
           </a:p>
         </p:txBody>
       </p:sp>
+      <p:sp>
+        <p:nvSpPr>
+          <p:cNvPr id="7" name="TextBox 6">
+            <a:extLst>
+              <a:ext uri="{FF2B5EF4-FFF2-40B4-BE49-F238E27FC236}">
+                <a16:creationId xmlns:a16="http://schemas.microsoft.com/office/drawing/2014/main" id="{28713D44-8845-3719-F567-B6CA9093058D}"/>
+              </a:ext>
+            </a:extLst>
+          </p:cNvPr>
+          <p:cNvSpPr txBox="1"/>
+          <p:nvPr/>
+        </p:nvSpPr>
+        <p:spPr>
+          <a:xfrm>
+            <a:off x="926960" y="4364392"/>
+            <a:ext cx="8840038" cy="369332"/>
+          </a:xfrm>
+          <a:prstGeom prst="rect">
+            <a:avLst/>
+          </a:prstGeom>
+          <a:noFill/>
+        </p:spPr>
+        <p:txBody>
+          <a:bodyPr wrap="square">
+            <a:spAutoFit/>
+          </a:bodyPr>
+          <a:lstStyle/>
+          <a:p>
+            <a:r>
+              <a:rPr lang="en-US" dirty="0" err="1">
+                <a:solidFill>
+                  <a:schemeClr val="tx2"/>
+                </a:solidFill>
+                <a:effectLst/>
+                <a:latin typeface="Consolas" panose="020B0609020204030204" pitchFamily="49" charset="0"/>
+              </a:rPr>
+              <a:t>train_test_split</a:t>
+            </a:r>
+            <a:r>
+              <a:rPr lang="en-US" dirty="0">
+                <a:solidFill>
+                  <a:schemeClr val="tx2"/>
+                </a:solidFill>
+                <a:effectLst/>
+                <a:latin typeface="Consolas" panose="020B0609020204030204" pitchFamily="49" charset="0"/>
+              </a:rPr>
+              <a:t>(</a:t>
+            </a:r>
+            <a:r>
+              <a:rPr lang="en-US" dirty="0" err="1">
+                <a:solidFill>
+                  <a:schemeClr val="tx2"/>
+                </a:solidFill>
+                <a:effectLst/>
+                <a:latin typeface="Consolas" panose="020B0609020204030204" pitchFamily="49" charset="0"/>
+              </a:rPr>
+              <a:t>scaled_data</a:t>
+            </a:r>
+            <a:r>
+              <a:rPr lang="en-US" dirty="0">
+                <a:solidFill>
+                  <a:schemeClr val="tx2"/>
+                </a:solidFill>
+                <a:effectLst/>
+                <a:latin typeface="Consolas" panose="020B0609020204030204" pitchFamily="49" charset="0"/>
+              </a:rPr>
+              <a:t>, y, </a:t>
+            </a:r>
+            <a:r>
+              <a:rPr lang="en-US" dirty="0" err="1">
+                <a:solidFill>
+                  <a:schemeClr val="tx2"/>
+                </a:solidFill>
+                <a:effectLst/>
+                <a:latin typeface="Consolas" panose="020B0609020204030204" pitchFamily="49" charset="0"/>
+              </a:rPr>
+              <a:t>test_size</a:t>
+            </a:r>
+            <a:r>
+              <a:rPr lang="en-US" dirty="0">
+                <a:solidFill>
+                  <a:schemeClr val="tx2"/>
+                </a:solidFill>
+                <a:effectLst/>
+                <a:latin typeface="Consolas" panose="020B0609020204030204" pitchFamily="49" charset="0"/>
+              </a:rPr>
+              <a:t>=.20, </a:t>
+            </a:r>
+            <a:r>
+              <a:rPr lang="en-US" dirty="0" err="1">
+                <a:solidFill>
+                  <a:schemeClr val="tx2"/>
+                </a:solidFill>
+                <a:effectLst/>
+                <a:latin typeface="Consolas" panose="020B0609020204030204" pitchFamily="49" charset="0"/>
+              </a:rPr>
+              <a:t>random_state</a:t>
+            </a:r>
+            <a:r>
+              <a:rPr lang="en-US" dirty="0">
+                <a:solidFill>
+                  <a:schemeClr val="tx2"/>
+                </a:solidFill>
+                <a:effectLst/>
+                <a:latin typeface="Consolas" panose="020B0609020204030204" pitchFamily="49" charset="0"/>
+              </a:rPr>
+              <a:t>=0)</a:t>
+            </a:r>
+          </a:p>
+        </p:txBody>
+      </p:sp>
       <p:pic>
         <p:nvPicPr>
-          <p:cNvPr id="5" name="Picture 4" descr="Graphical user interface, text&#10;&#10;Description automatically generated">
-            <a:extLst>
-              <a:ext uri="{FF2B5EF4-FFF2-40B4-BE49-F238E27FC236}">
-                <a16:creationId xmlns:a16="http://schemas.microsoft.com/office/drawing/2014/main" id="{047FE713-1748-9383-E2F2-240890502206}"/>
+          <p:cNvPr id="4" name="Picture 3" descr="Graphical user interface&#10;&#10;Description automatically generated with medium confidence">
+            <a:extLst>
+              <a:ext uri="{FF2B5EF4-FFF2-40B4-BE49-F238E27FC236}">
+                <a16:creationId xmlns:a16="http://schemas.microsoft.com/office/drawing/2014/main" id="{B34F3334-0BDE-A790-7495-FA3660D015F3}"/>
               </a:ext>
             </a:extLst>
           </p:cNvPr>
@@ -9005,125 +9469,14 @@
         </p:blipFill>
         <p:spPr>
           <a:xfrm>
-            <a:off x="711929" y="1759280"/>
-            <a:ext cx="10212225" cy="1771897"/>
+            <a:off x="371736" y="2321169"/>
+            <a:ext cx="10887336" cy="1398511"/>
           </a:xfrm>
           <a:prstGeom prst="rect">
             <a:avLst/>
           </a:prstGeom>
         </p:spPr>
       </p:pic>
-      <p:sp>
-        <p:nvSpPr>
-          <p:cNvPr id="7" name="TextBox 6">
-            <a:extLst>
-              <a:ext uri="{FF2B5EF4-FFF2-40B4-BE49-F238E27FC236}">
-                <a16:creationId xmlns:a16="http://schemas.microsoft.com/office/drawing/2014/main" id="{28713D44-8845-3719-F567-B6CA9093058D}"/>
-              </a:ext>
-            </a:extLst>
-          </p:cNvPr>
-          <p:cNvSpPr txBox="1"/>
-          <p:nvPr/>
-        </p:nvSpPr>
-        <p:spPr>
-          <a:xfrm>
-            <a:off x="926960" y="4364392"/>
-            <a:ext cx="8840038" cy="369332"/>
-          </a:xfrm>
-          <a:prstGeom prst="rect">
-            <a:avLst/>
-          </a:prstGeom>
-          <a:noFill/>
-        </p:spPr>
-        <p:txBody>
-          <a:bodyPr wrap="square">
-            <a:spAutoFit/>
-          </a:bodyPr>
-          <a:lstStyle/>
-          <a:p>
-            <a:r>
-              <a:rPr lang="en-US" dirty="0" err="1">
-                <a:solidFill>
-                  <a:schemeClr val="tx2"/>
-                </a:solidFill>
-                <a:effectLst/>
-                <a:latin typeface="Consolas" panose="020B0609020204030204" pitchFamily="49" charset="0"/>
-              </a:rPr>
-              <a:t>train_test_split</a:t>
-            </a:r>
-            <a:r>
-              <a:rPr lang="en-US" dirty="0">
-                <a:solidFill>
-                  <a:schemeClr val="tx2"/>
-                </a:solidFill>
-                <a:effectLst/>
-                <a:latin typeface="Consolas" panose="020B0609020204030204" pitchFamily="49" charset="0"/>
-              </a:rPr>
-              <a:t>(</a:t>
-            </a:r>
-            <a:r>
-              <a:rPr lang="en-US" dirty="0" err="1">
-                <a:solidFill>
-                  <a:schemeClr val="tx2"/>
-                </a:solidFill>
-                <a:effectLst/>
-                <a:latin typeface="Consolas" panose="020B0609020204030204" pitchFamily="49" charset="0"/>
-              </a:rPr>
-              <a:t>scaled_data</a:t>
-            </a:r>
-            <a:r>
-              <a:rPr lang="en-US" dirty="0">
-                <a:solidFill>
-                  <a:schemeClr val="tx2"/>
-                </a:solidFill>
-                <a:effectLst/>
-                <a:latin typeface="Consolas" panose="020B0609020204030204" pitchFamily="49" charset="0"/>
-              </a:rPr>
-              <a:t>, y, </a:t>
-            </a:r>
-            <a:r>
-              <a:rPr lang="en-US" dirty="0" err="1">
-                <a:solidFill>
-                  <a:schemeClr val="tx2"/>
-                </a:solidFill>
-                <a:effectLst/>
-                <a:latin typeface="Consolas" panose="020B0609020204030204" pitchFamily="49" charset="0"/>
-              </a:rPr>
-              <a:t>test_size</a:t>
-            </a:r>
-            <a:r>
-              <a:rPr lang="en-US" dirty="0">
-                <a:solidFill>
-                  <a:schemeClr val="tx2"/>
-                </a:solidFill>
-                <a:effectLst/>
-                <a:latin typeface="Consolas" panose="020B0609020204030204" pitchFamily="49" charset="0"/>
-              </a:rPr>
-              <a:t>=.20, </a:t>
-            </a:r>
-            <a:r>
-              <a:rPr lang="en-US" dirty="0" err="1">
-                <a:solidFill>
-                  <a:schemeClr val="tx2"/>
-                </a:solidFill>
-                <a:effectLst/>
-                <a:latin typeface="Consolas" panose="020B0609020204030204" pitchFamily="49" charset="0"/>
-              </a:rPr>
-              <a:t>random_state</a:t>
-            </a:r>
-            <a:r>
-              <a:rPr lang="en-US" dirty="0">
-                <a:solidFill>
-                  <a:schemeClr val="tx2"/>
-                </a:solidFill>
-                <a:effectLst/>
-                <a:latin typeface="Consolas" panose="020B0609020204030204" pitchFamily="49" charset="0"/>
-              </a:rPr>
-              <a:t>=0)</a:t>
-            </a:r>
-          </a:p>
-        </p:txBody>
-      </p:sp>
     </p:spTree>
     <p:extLst>
       <p:ext uri="{BB962C8B-B14F-4D97-AF65-F5344CB8AC3E}">
@@ -9172,12 +9525,14 @@
         </p:nvSpPr>
         <p:spPr/>
         <p:txBody>
-          <a:bodyPr/>
+          <a:bodyPr>
+            <a:normAutofit fontScale="90000"/>
+          </a:bodyPr>
           <a:lstStyle/>
           <a:p>
             <a:r>
               <a:rPr lang="en-US" dirty="0"/>
-              <a:t>Model Selection</a:t>
+              <a:t>Model Selection – Regression Techniques</a:t>
             </a:r>
           </a:p>
         </p:txBody>
@@ -9198,7 +9553,12 @@
             <p:ph type="body" idx="1"/>
           </p:nvPr>
         </p:nvSpPr>
-        <p:spPr/>
+        <p:spPr>
+          <a:xfrm>
+            <a:off x="3530235" y="2070938"/>
+            <a:ext cx="5131529" cy="4079696"/>
+          </a:xfrm>
+        </p:spPr>
         <p:txBody>
           <a:bodyPr/>
           <a:lstStyle/>
@@ -9271,7 +9631,7 @@
                 <a:effectLst/>
                 <a:latin typeface="Consolas" panose="020B0609020204030204" pitchFamily="49" charset="0"/>
               </a:rPr>
-              <a:t>* Lasso Regressor</a:t>
+              <a:t>* Ridge Regressor</a:t>
             </a:r>
           </a:p>
           <a:p>
@@ -9283,7 +9643,7 @@
                 <a:effectLst/>
                 <a:latin typeface="Consolas" panose="020B0609020204030204" pitchFamily="49" charset="0"/>
               </a:rPr>
-              <a:t>* Ridge Regressor</a:t>
+              <a:t>* OLS Summary Report</a:t>
             </a:r>
           </a:p>
           <a:p>
@@ -9291,36 +9651,6 @@
           </a:p>
         </p:txBody>
       </p:sp>
-      <p:pic>
-        <p:nvPicPr>
-          <p:cNvPr id="6" name="Picture 5" descr="Text&#10;&#10;Description automatically generated">
-            <a:extLst>
-              <a:ext uri="{FF2B5EF4-FFF2-40B4-BE49-F238E27FC236}">
-                <a16:creationId xmlns:a16="http://schemas.microsoft.com/office/drawing/2014/main" id="{EB609E7D-6DB4-D67B-616E-B52C582940D1}"/>
-              </a:ext>
-            </a:extLst>
-          </p:cNvPr>
-          <p:cNvPicPr>
-            <a:picLocks noChangeAspect="1"/>
-          </p:cNvPicPr>
-          <p:nvPr/>
-        </p:nvPicPr>
-        <p:blipFill>
-          <a:blip r:embed="rId2"/>
-          <a:stretch>
-            <a:fillRect/>
-          </a:stretch>
-        </p:blipFill>
-        <p:spPr>
-          <a:xfrm>
-            <a:off x="5208819" y="3846857"/>
-            <a:ext cx="6677957" cy="1314633"/>
-          </a:xfrm>
-          <a:prstGeom prst="rect">
-            <a:avLst/>
-          </a:prstGeom>
-        </p:spPr>
-      </p:pic>
     </p:spTree>
     <p:extLst>
       <p:ext uri="{BB962C8B-B14F-4D97-AF65-F5344CB8AC3E}">
@@ -9374,17 +9704,17 @@
           <a:p>
             <a:r>
               <a:rPr lang="en-US" dirty="0"/>
-              <a:t>OLS Summary</a:t>
+              <a:t>Model Selection</a:t>
             </a:r>
           </a:p>
         </p:txBody>
       </p:sp>
       <p:pic>
         <p:nvPicPr>
-          <p:cNvPr id="6" name="Picture 5" descr="Text&#10;&#10;Description automatically generated">
-            <a:extLst>
-              <a:ext uri="{FF2B5EF4-FFF2-40B4-BE49-F238E27FC236}">
-                <a16:creationId xmlns:a16="http://schemas.microsoft.com/office/drawing/2014/main" id="{1560371E-4894-75D1-F490-424A047DDC12}"/>
+          <p:cNvPr id="5" name="Picture 4" descr="Graphical user interface, application&#10;&#10;Description automatically generated">
+            <a:extLst>
+              <a:ext uri="{FF2B5EF4-FFF2-40B4-BE49-F238E27FC236}">
+                <a16:creationId xmlns:a16="http://schemas.microsoft.com/office/drawing/2014/main" id="{88B329F6-A034-3128-52AB-F6E4E0A70503}"/>
               </a:ext>
             </a:extLst>
           </p:cNvPr>
@@ -9401,8 +9731,75 @@
         </p:blipFill>
         <p:spPr>
           <a:xfrm>
-            <a:off x="2974173" y="1409813"/>
-            <a:ext cx="5991112" cy="5178364"/>
+            <a:off x="6645468" y="2143734"/>
+            <a:ext cx="3000794" cy="4182059"/>
+          </a:xfrm>
+          <a:prstGeom prst="rect">
+            <a:avLst/>
+          </a:prstGeom>
+        </p:spPr>
+      </p:pic>
+      <p:sp>
+        <p:nvSpPr>
+          <p:cNvPr id="6" name="TextBox 5">
+            <a:extLst>
+              <a:ext uri="{FF2B5EF4-FFF2-40B4-BE49-F238E27FC236}">
+                <a16:creationId xmlns:a16="http://schemas.microsoft.com/office/drawing/2014/main" id="{C845E63C-3703-1D7C-4A11-4A093487635E}"/>
+              </a:ext>
+            </a:extLst>
+          </p:cNvPr>
+          <p:cNvSpPr txBox="1"/>
+          <p:nvPr/>
+        </p:nvSpPr>
+        <p:spPr>
+          <a:xfrm>
+            <a:off x="711929" y="2321169"/>
+            <a:ext cx="4412730" cy="1569660"/>
+          </a:xfrm>
+          <a:prstGeom prst="rect">
+            <a:avLst/>
+          </a:prstGeom>
+          <a:noFill/>
+        </p:spPr>
+        <p:txBody>
+          <a:bodyPr wrap="square" rtlCol="0">
+            <a:spAutoFit/>
+          </a:bodyPr>
+          <a:lstStyle/>
+          <a:p>
+            <a:r>
+              <a:rPr lang="en-US" sz="2400" dirty="0">
+                <a:latin typeface="Futura Md BT" panose="020B0602020204020303"/>
+              </a:rPr>
+              <a:t>For every model listed, a dataframe of feature importance, bar graph, table entry is shown</a:t>
+            </a:r>
+          </a:p>
+        </p:txBody>
+      </p:sp>
+      <p:pic>
+        <p:nvPicPr>
+          <p:cNvPr id="8" name="Picture 7" descr="Graphical user interface, application&#10;&#10;Description automatically generated">
+            <a:extLst>
+              <a:ext uri="{FF2B5EF4-FFF2-40B4-BE49-F238E27FC236}">
+                <a16:creationId xmlns:a16="http://schemas.microsoft.com/office/drawing/2014/main" id="{FD035326-5433-CDC2-40B5-3F981CB478E8}"/>
+              </a:ext>
+            </a:extLst>
+          </p:cNvPr>
+          <p:cNvPicPr>
+            <a:picLocks noChangeAspect="1"/>
+          </p:cNvPicPr>
+          <p:nvPr/>
+        </p:nvPicPr>
+        <p:blipFill>
+          <a:blip r:embed="rId3"/>
+          <a:stretch>
+            <a:fillRect/>
+          </a:stretch>
+        </p:blipFill>
+        <p:spPr>
+          <a:xfrm>
+            <a:off x="218255" y="4234764"/>
+            <a:ext cx="5877745" cy="2086266"/>
           </a:xfrm>
           <a:prstGeom prst="rect">
             <a:avLst/>
@@ -9412,7 +9809,7 @@
     </p:spTree>
     <p:extLst>
       <p:ext uri="{BB962C8B-B14F-4D97-AF65-F5344CB8AC3E}">
-        <p14:creationId xmlns:p14="http://schemas.microsoft.com/office/powerpoint/2010/main" val="3559523306"/>
+        <p14:creationId xmlns:p14="http://schemas.microsoft.com/office/powerpoint/2010/main" val="1233587953"/>
       </p:ext>
     </p:extLst>
   </p:cSld>

</xml_diff>

<commit_message>
add break out time
</commit_message>
<xml_diff>
--- a/midterm/heather_lemon_midterm.pptx
+++ b/midterm/heather_lemon_midterm.pptx
@@ -213,7 +213,7 @@
           <a:p>
             <a:fld id="{0899C1D7-0031-1541-AA63-7FAEC1216BBD}" type="datetimeFigureOut">
               <a:rPr lang="en-US" smtClean="0"/>
-              <a:t>4/5/2023</a:t>
+              <a:t>4/6/2023</a:t>
             </a:fld>
             <a:endParaRPr lang="en-US"/>
           </a:p>
@@ -7083,7 +7083,7 @@
           <a:p>
             <a:fld id="{D386965C-165C-764D-B490-A5796C92088F}" type="datetimeFigureOut">
               <a:rPr lang="en-US" smtClean="0"/>
-              <a:t>4/5/2023</a:t>
+              <a:t>4/6/2023</a:t>
             </a:fld>
             <a:endParaRPr lang="en-US"/>
           </a:p>
@@ -9351,7 +9351,7 @@
         <p:spPr>
           <a:xfrm>
             <a:off x="926960" y="4364392"/>
-            <a:ext cx="8840038" cy="369332"/>
+            <a:ext cx="8840038" cy="1200329"/>
           </a:xfrm>
           <a:prstGeom prst="rect">
             <a:avLst/>
@@ -9443,6 +9443,26 @@
                 <a:latin typeface="Consolas" panose="020B0609020204030204" pitchFamily="49" charset="0"/>
               </a:rPr>
               <a:t>=0)</a:t>
+            </a:r>
+          </a:p>
+          <a:p>
+            <a:endParaRPr lang="en-US" dirty="0">
+              <a:solidFill>
+                <a:schemeClr val="tx2"/>
+              </a:solidFill>
+              <a:latin typeface="Consolas" panose="020B0609020204030204" pitchFamily="49" charset="0"/>
+            </a:endParaRPr>
+          </a:p>
+          <a:p>
+            <a:r>
+              <a:rPr lang="en-US" dirty="0">
+                <a:solidFill>
+                  <a:schemeClr val="tx2"/>
+                </a:solidFill>
+                <a:effectLst/>
+                <a:latin typeface="Consolas" panose="020B0609020204030204" pitchFamily="49" charset="0"/>
+              </a:rPr>
+              <a:t>Break out time percentages for data cleaning and EDA was 50% and the other 50% was model building, evaluation, and results/conclusions. </a:t>
             </a:r>
           </a:p>
         </p:txBody>

</xml_diff>

<commit_message>
add conclusion results, update pwt
</commit_message>
<xml_diff>
--- a/midterm/heather_lemon_midterm.pptx
+++ b/midterm/heather_lemon_midterm.pptx
@@ -5,7 +5,7 @@
     <p:sldMasterId id="2147483648" r:id="rId1"/>
   </p:sldMasterIdLst>
   <p:notesMasterIdLst>
-    <p:notesMasterId r:id="rId19"/>
+    <p:notesMasterId r:id="rId18"/>
   </p:notesMasterIdLst>
   <p:sldIdLst>
     <p:sldId id="258" r:id="rId2"/>
@@ -15,16 +15,15 @@
     <p:sldId id="264" r:id="rId6"/>
     <p:sldId id="265" r:id="rId7"/>
     <p:sldId id="266" r:id="rId8"/>
-    <p:sldId id="267" r:id="rId9"/>
-    <p:sldId id="275" r:id="rId10"/>
-    <p:sldId id="277" r:id="rId11"/>
-    <p:sldId id="274" r:id="rId12"/>
-    <p:sldId id="278" r:id="rId13"/>
-    <p:sldId id="270" r:id="rId14"/>
-    <p:sldId id="273" r:id="rId15"/>
-    <p:sldId id="269" r:id="rId16"/>
-    <p:sldId id="271" r:id="rId17"/>
-    <p:sldId id="276" r:id="rId18"/>
+    <p:sldId id="275" r:id="rId9"/>
+    <p:sldId id="277" r:id="rId10"/>
+    <p:sldId id="274" r:id="rId11"/>
+    <p:sldId id="278" r:id="rId12"/>
+    <p:sldId id="270" r:id="rId13"/>
+    <p:sldId id="273" r:id="rId14"/>
+    <p:sldId id="269" r:id="rId15"/>
+    <p:sldId id="271" r:id="rId16"/>
+    <p:sldId id="276" r:id="rId17"/>
   </p:sldIdLst>
   <p:sldSz cx="12192000" cy="6858000"/>
   <p:notesSz cx="6858000" cy="9144000"/>
@@ -213,7 +212,7 @@
           <a:p>
             <a:fld id="{0899C1D7-0031-1541-AA63-7FAEC1216BBD}" type="datetimeFigureOut">
               <a:rPr lang="en-US" smtClean="0"/>
-              <a:t>4/6/2023</a:t>
+              <a:t>4/14/2023</a:t>
             </a:fld>
             <a:endParaRPr lang="en-US"/>
           </a:p>
@@ -480,6 +479,724 @@
 </p:notesMaster>
 </file>
 
+<file path=ppt/notesSlides/notesSlide1.xml><?xml version="1.0" encoding="utf-8"?>
+<p:notes xmlns:a="http://schemas.openxmlformats.org/drawingml/2006/main" xmlns:r="http://schemas.openxmlformats.org/officeDocument/2006/relationships" xmlns:p="http://schemas.openxmlformats.org/presentationml/2006/main">
+  <p:cSld>
+    <p:spTree>
+      <p:nvGrpSpPr>
+        <p:cNvPr id="1" name=""/>
+        <p:cNvGrpSpPr/>
+        <p:nvPr/>
+      </p:nvGrpSpPr>
+      <p:grpSpPr>
+        <a:xfrm>
+          <a:off x="0" y="0"/>
+          <a:ext cx="0" cy="0"/>
+          <a:chOff x="0" y="0"/>
+          <a:chExt cx="0" cy="0"/>
+        </a:xfrm>
+      </p:grpSpPr>
+      <p:sp>
+        <p:nvSpPr>
+          <p:cNvPr id="2" name="Slide Image Placeholder 1"/>
+          <p:cNvSpPr>
+            <a:spLocks noGrp="1" noRot="1" noChangeAspect="1"/>
+          </p:cNvSpPr>
+          <p:nvPr>
+            <p:ph type="sldImg"/>
+          </p:nvPr>
+        </p:nvSpPr>
+        <p:spPr/>
+      </p:sp>
+      <p:sp>
+        <p:nvSpPr>
+          <p:cNvPr id="3" name="Notes Placeholder 2"/>
+          <p:cNvSpPr>
+            <a:spLocks noGrp="1"/>
+          </p:cNvSpPr>
+          <p:nvPr>
+            <p:ph type="body" idx="1"/>
+          </p:nvPr>
+        </p:nvSpPr>
+        <p:spPr/>
+        <p:txBody>
+          <a:bodyPr/>
+          <a:lstStyle/>
+          <a:p>
+            <a:r>
+              <a:rPr lang="en-US" dirty="0"/>
+              <a:t>I chose the </a:t>
+            </a:r>
+            <a:r>
+              <a:rPr lang="en-US" dirty="0" err="1"/>
+              <a:t>spotify</a:t>
+            </a:r>
+            <a:r>
+              <a:rPr lang="en-US" dirty="0"/>
+              <a:t> dataset because I am currently learning how to play the cello and it would be interesting to learn more about the music space.</a:t>
+            </a:r>
+          </a:p>
+        </p:txBody>
+      </p:sp>
+      <p:sp>
+        <p:nvSpPr>
+          <p:cNvPr id="4" name="Slide Number Placeholder 3"/>
+          <p:cNvSpPr>
+            <a:spLocks noGrp="1"/>
+          </p:cNvSpPr>
+          <p:nvPr>
+            <p:ph type="sldNum" sz="quarter" idx="5"/>
+          </p:nvPr>
+        </p:nvSpPr>
+        <p:spPr/>
+        <p:txBody>
+          <a:bodyPr/>
+          <a:lstStyle/>
+          <a:p>
+            <a:fld id="{5CD270A4-E417-1544-8D83-51C2B4F7CE0F}" type="slidenum">
+              <a:rPr lang="en-US" smtClean="0"/>
+              <a:t>2</a:t>
+            </a:fld>
+            <a:endParaRPr lang="en-US"/>
+          </a:p>
+        </p:txBody>
+      </p:sp>
+    </p:spTree>
+    <p:extLst>
+      <p:ext uri="{BB962C8B-B14F-4D97-AF65-F5344CB8AC3E}">
+        <p14:creationId xmlns:p14="http://schemas.microsoft.com/office/powerpoint/2010/main" val="1827595557"/>
+      </p:ext>
+    </p:extLst>
+  </p:cSld>
+  <p:clrMapOvr>
+    <a:masterClrMapping/>
+  </p:clrMapOvr>
+</p:notes>
+</file>
+
+<file path=ppt/notesSlides/notesSlide2.xml><?xml version="1.0" encoding="utf-8"?>
+<p:notes xmlns:a="http://schemas.openxmlformats.org/drawingml/2006/main" xmlns:r="http://schemas.openxmlformats.org/officeDocument/2006/relationships" xmlns:p="http://schemas.openxmlformats.org/presentationml/2006/main">
+  <p:cSld>
+    <p:spTree>
+      <p:nvGrpSpPr>
+        <p:cNvPr id="1" name=""/>
+        <p:cNvGrpSpPr/>
+        <p:nvPr/>
+      </p:nvGrpSpPr>
+      <p:grpSpPr>
+        <a:xfrm>
+          <a:off x="0" y="0"/>
+          <a:ext cx="0" cy="0"/>
+          <a:chOff x="0" y="0"/>
+          <a:chExt cx="0" cy="0"/>
+        </a:xfrm>
+      </p:grpSpPr>
+      <p:sp>
+        <p:nvSpPr>
+          <p:cNvPr id="2" name="Slide Image Placeholder 1"/>
+          <p:cNvSpPr>
+            <a:spLocks noGrp="1" noRot="1" noChangeAspect="1"/>
+          </p:cNvSpPr>
+          <p:nvPr>
+            <p:ph type="sldImg"/>
+          </p:nvPr>
+        </p:nvSpPr>
+        <p:spPr/>
+      </p:sp>
+      <p:sp>
+        <p:nvSpPr>
+          <p:cNvPr id="3" name="Notes Placeholder 2"/>
+          <p:cNvSpPr>
+            <a:spLocks noGrp="1"/>
+          </p:cNvSpPr>
+          <p:nvPr>
+            <p:ph type="body" idx="1"/>
+          </p:nvPr>
+        </p:nvSpPr>
+        <p:spPr/>
+        <p:txBody>
+          <a:bodyPr/>
+          <a:lstStyle/>
+          <a:p>
+            <a:endParaRPr lang="en-US" dirty="0"/>
+          </a:p>
+        </p:txBody>
+      </p:sp>
+      <p:sp>
+        <p:nvSpPr>
+          <p:cNvPr id="4" name="Slide Number Placeholder 3"/>
+          <p:cNvSpPr>
+            <a:spLocks noGrp="1"/>
+          </p:cNvSpPr>
+          <p:nvPr>
+            <p:ph type="sldNum" sz="quarter" idx="5"/>
+          </p:nvPr>
+        </p:nvSpPr>
+        <p:spPr/>
+        <p:txBody>
+          <a:bodyPr/>
+          <a:lstStyle/>
+          <a:p>
+            <a:fld id="{5CD270A4-E417-1544-8D83-51C2B4F7CE0F}" type="slidenum">
+              <a:rPr lang="en-US" smtClean="0"/>
+              <a:t>3</a:t>
+            </a:fld>
+            <a:endParaRPr lang="en-US"/>
+          </a:p>
+        </p:txBody>
+      </p:sp>
+    </p:spTree>
+    <p:extLst>
+      <p:ext uri="{BB962C8B-B14F-4D97-AF65-F5344CB8AC3E}">
+        <p14:creationId xmlns:p14="http://schemas.microsoft.com/office/powerpoint/2010/main" val="3910988151"/>
+      </p:ext>
+    </p:extLst>
+  </p:cSld>
+  <p:clrMapOvr>
+    <a:masterClrMapping/>
+  </p:clrMapOvr>
+</p:notes>
+</file>
+
+<file path=ppt/notesSlides/notesSlide3.xml><?xml version="1.0" encoding="utf-8"?>
+<p:notes xmlns:a="http://schemas.openxmlformats.org/drawingml/2006/main" xmlns:r="http://schemas.openxmlformats.org/officeDocument/2006/relationships" xmlns:p="http://schemas.openxmlformats.org/presentationml/2006/main">
+  <p:cSld>
+    <p:spTree>
+      <p:nvGrpSpPr>
+        <p:cNvPr id="1" name=""/>
+        <p:cNvGrpSpPr/>
+        <p:nvPr/>
+      </p:nvGrpSpPr>
+      <p:grpSpPr>
+        <a:xfrm>
+          <a:off x="0" y="0"/>
+          <a:ext cx="0" cy="0"/>
+          <a:chOff x="0" y="0"/>
+          <a:chExt cx="0" cy="0"/>
+        </a:xfrm>
+      </p:grpSpPr>
+      <p:sp>
+        <p:nvSpPr>
+          <p:cNvPr id="2" name="Slide Image Placeholder 1"/>
+          <p:cNvSpPr>
+            <a:spLocks noGrp="1" noRot="1" noChangeAspect="1"/>
+          </p:cNvSpPr>
+          <p:nvPr>
+            <p:ph type="sldImg"/>
+          </p:nvPr>
+        </p:nvSpPr>
+        <p:spPr/>
+      </p:sp>
+      <p:sp>
+        <p:nvSpPr>
+          <p:cNvPr id="3" name="Notes Placeholder 2"/>
+          <p:cNvSpPr>
+            <a:spLocks noGrp="1"/>
+          </p:cNvSpPr>
+          <p:nvPr>
+            <p:ph type="body" idx="1"/>
+          </p:nvPr>
+        </p:nvSpPr>
+        <p:spPr/>
+        <p:txBody>
+          <a:bodyPr/>
+          <a:lstStyle/>
+          <a:p>
+            <a:r>
+              <a:rPr lang="en-US" dirty="0"/>
+              <a:t>I initially wanted to do a pair plot but with 14 features it was taking too long to generate so I did the histogram instead</a:t>
+            </a:r>
+          </a:p>
+        </p:txBody>
+      </p:sp>
+      <p:sp>
+        <p:nvSpPr>
+          <p:cNvPr id="4" name="Slide Number Placeholder 3"/>
+          <p:cNvSpPr>
+            <a:spLocks noGrp="1"/>
+          </p:cNvSpPr>
+          <p:nvPr>
+            <p:ph type="sldNum" sz="quarter" idx="5"/>
+          </p:nvPr>
+        </p:nvSpPr>
+        <p:spPr/>
+        <p:txBody>
+          <a:bodyPr/>
+          <a:lstStyle/>
+          <a:p>
+            <a:fld id="{5CD270A4-E417-1544-8D83-51C2B4F7CE0F}" type="slidenum">
+              <a:rPr lang="en-US" smtClean="0"/>
+              <a:t>5</a:t>
+            </a:fld>
+            <a:endParaRPr lang="en-US"/>
+          </a:p>
+        </p:txBody>
+      </p:sp>
+    </p:spTree>
+    <p:extLst>
+      <p:ext uri="{BB962C8B-B14F-4D97-AF65-F5344CB8AC3E}">
+        <p14:creationId xmlns:p14="http://schemas.microsoft.com/office/powerpoint/2010/main" val="2352635374"/>
+      </p:ext>
+    </p:extLst>
+  </p:cSld>
+  <p:clrMapOvr>
+    <a:masterClrMapping/>
+  </p:clrMapOvr>
+</p:notes>
+</file>
+
+<file path=ppt/notesSlides/notesSlide4.xml><?xml version="1.0" encoding="utf-8"?>
+<p:notes xmlns:a="http://schemas.openxmlformats.org/drawingml/2006/main" xmlns:r="http://schemas.openxmlformats.org/officeDocument/2006/relationships" xmlns:p="http://schemas.openxmlformats.org/presentationml/2006/main">
+  <p:cSld>
+    <p:spTree>
+      <p:nvGrpSpPr>
+        <p:cNvPr id="1" name=""/>
+        <p:cNvGrpSpPr/>
+        <p:nvPr/>
+      </p:nvGrpSpPr>
+      <p:grpSpPr>
+        <a:xfrm>
+          <a:off x="0" y="0"/>
+          <a:ext cx="0" cy="0"/>
+          <a:chOff x="0" y="0"/>
+          <a:chExt cx="0" cy="0"/>
+        </a:xfrm>
+      </p:grpSpPr>
+      <p:sp>
+        <p:nvSpPr>
+          <p:cNvPr id="2" name="Slide Image Placeholder 1"/>
+          <p:cNvSpPr>
+            <a:spLocks noGrp="1" noRot="1" noChangeAspect="1"/>
+          </p:cNvSpPr>
+          <p:nvPr>
+            <p:ph type="sldImg"/>
+          </p:nvPr>
+        </p:nvSpPr>
+        <p:spPr/>
+      </p:sp>
+      <p:sp>
+        <p:nvSpPr>
+          <p:cNvPr id="3" name="Notes Placeholder 2"/>
+          <p:cNvSpPr>
+            <a:spLocks noGrp="1"/>
+          </p:cNvSpPr>
+          <p:nvPr>
+            <p:ph type="body" idx="1"/>
+          </p:nvPr>
+        </p:nvSpPr>
+        <p:spPr/>
+        <p:txBody>
+          <a:bodyPr/>
+          <a:lstStyle/>
+          <a:p>
+            <a:r>
+              <a:rPr lang="en-US" b="0" dirty="0">
+                <a:solidFill>
+                  <a:srgbClr val="D4D4D4"/>
+                </a:solidFill>
+                <a:effectLst/>
+                <a:latin typeface="Consolas" panose="020B0609020204030204" pitchFamily="49" charset="0"/>
+              </a:rPr>
+              <a:t>We can see immediately that energy and loudness have a strong positive correlation. </a:t>
+            </a:r>
+          </a:p>
+          <a:p>
+            <a:r>
+              <a:rPr lang="en-US" b="0" dirty="0">
+                <a:solidFill>
+                  <a:srgbClr val="D4D4D4"/>
+                </a:solidFill>
+                <a:effectLst/>
+                <a:latin typeface="Consolas" panose="020B0609020204030204" pitchFamily="49" charset="0"/>
+              </a:rPr>
+              <a:t>Valance and danceability, energy and loudness all have a positive correlation. </a:t>
+            </a:r>
+          </a:p>
+          <a:p>
+            <a:r>
+              <a:rPr lang="en-US" b="0" dirty="0">
+                <a:solidFill>
+                  <a:srgbClr val="D4D4D4"/>
+                </a:solidFill>
+                <a:effectLst/>
+                <a:latin typeface="Consolas" panose="020B0609020204030204" pitchFamily="49" charset="0"/>
+              </a:rPr>
+              <a:t>Loudness and speechiness have a negative correlation, which makes sense if a song is very loud you likely cannot hear the person singing in the background unless you're talking about death metal :) Surprising note - I expected danceability to have a stronger correlation with loudness, but there can be songs to be used to dance formally like a waltz or tango.</a:t>
+            </a:r>
+          </a:p>
+          <a:p>
+            <a:r>
+              <a:rPr lang="en-US" b="0" dirty="0">
+                <a:solidFill>
+                  <a:srgbClr val="D4D4D4"/>
+                </a:solidFill>
+                <a:effectLst/>
+                <a:latin typeface="Consolas" panose="020B0609020204030204" pitchFamily="49" charset="0"/>
+              </a:rPr>
+              <a:t>This was one of six EDAs graphs I did. </a:t>
+            </a:r>
+          </a:p>
+        </p:txBody>
+      </p:sp>
+      <p:sp>
+        <p:nvSpPr>
+          <p:cNvPr id="4" name="Slide Number Placeholder 3"/>
+          <p:cNvSpPr>
+            <a:spLocks noGrp="1"/>
+          </p:cNvSpPr>
+          <p:nvPr>
+            <p:ph type="sldNum" sz="quarter" idx="5"/>
+          </p:nvPr>
+        </p:nvSpPr>
+        <p:spPr/>
+        <p:txBody>
+          <a:bodyPr/>
+          <a:lstStyle/>
+          <a:p>
+            <a:fld id="{5CD270A4-E417-1544-8D83-51C2B4F7CE0F}" type="slidenum">
+              <a:rPr lang="en-US" smtClean="0"/>
+              <a:t>6</a:t>
+            </a:fld>
+            <a:endParaRPr lang="en-US"/>
+          </a:p>
+        </p:txBody>
+      </p:sp>
+    </p:spTree>
+    <p:extLst>
+      <p:ext uri="{BB962C8B-B14F-4D97-AF65-F5344CB8AC3E}">
+        <p14:creationId xmlns:p14="http://schemas.microsoft.com/office/powerpoint/2010/main" val="3472182259"/>
+      </p:ext>
+    </p:extLst>
+  </p:cSld>
+  <p:clrMapOvr>
+    <a:masterClrMapping/>
+  </p:clrMapOvr>
+</p:notes>
+</file>
+
+<file path=ppt/notesSlides/notesSlide5.xml><?xml version="1.0" encoding="utf-8"?>
+<p:notes xmlns:a="http://schemas.openxmlformats.org/drawingml/2006/main" xmlns:r="http://schemas.openxmlformats.org/officeDocument/2006/relationships" xmlns:p="http://schemas.openxmlformats.org/presentationml/2006/main">
+  <p:cSld>
+    <p:spTree>
+      <p:nvGrpSpPr>
+        <p:cNvPr id="1" name=""/>
+        <p:cNvGrpSpPr/>
+        <p:nvPr/>
+      </p:nvGrpSpPr>
+      <p:grpSpPr>
+        <a:xfrm>
+          <a:off x="0" y="0"/>
+          <a:ext cx="0" cy="0"/>
+          <a:chOff x="0" y="0"/>
+          <a:chExt cx="0" cy="0"/>
+        </a:xfrm>
+      </p:grpSpPr>
+      <p:sp>
+        <p:nvSpPr>
+          <p:cNvPr id="2" name="Slide Image Placeholder 1"/>
+          <p:cNvSpPr>
+            <a:spLocks noGrp="1" noRot="1" noChangeAspect="1"/>
+          </p:cNvSpPr>
+          <p:nvPr>
+            <p:ph type="sldImg"/>
+          </p:nvPr>
+        </p:nvSpPr>
+        <p:spPr/>
+      </p:sp>
+      <p:sp>
+        <p:nvSpPr>
+          <p:cNvPr id="3" name="Notes Placeholder 2"/>
+          <p:cNvSpPr>
+            <a:spLocks noGrp="1"/>
+          </p:cNvSpPr>
+          <p:nvPr>
+            <p:ph type="body" idx="1"/>
+          </p:nvPr>
+        </p:nvSpPr>
+        <p:spPr/>
+        <p:txBody>
+          <a:bodyPr/>
+          <a:lstStyle/>
+          <a:p>
+            <a:pPr marL="0" marR="0" lvl="0" indent="0" algn="l" defTabSz="914400" rtl="0" eaLnBrk="1" fontAlgn="auto" latinLnBrk="0" hangingPunct="1">
+              <a:lnSpc>
+                <a:spcPct val="100000"/>
+              </a:lnSpc>
+              <a:spcBef>
+                <a:spcPts val="0"/>
+              </a:spcBef>
+              <a:spcAft>
+                <a:spcPts val="0"/>
+              </a:spcAft>
+              <a:buClrTx/>
+              <a:buSzTx/>
+              <a:buFontTx/>
+              <a:buNone/>
+              <a:tabLst/>
+              <a:defRPr/>
+            </a:pPr>
+            <a:r>
+              <a:rPr lang="en-US" dirty="0"/>
+              <a:t>Generic 80/20 split with a standard scalar. </a:t>
+            </a:r>
+            <a:r>
+              <a:rPr lang="en-US" b="0" dirty="0">
+                <a:solidFill>
+                  <a:srgbClr val="D4D4D4"/>
+                </a:solidFill>
+                <a:effectLst/>
+                <a:latin typeface="Consolas" panose="020B0609020204030204" pitchFamily="49" charset="0"/>
+              </a:rPr>
+              <a:t>We scale the data because the features all have different relational values </a:t>
+            </a:r>
+            <a:r>
+              <a:rPr lang="en-US" b="0" dirty="0" err="1">
+                <a:solidFill>
+                  <a:srgbClr val="D4D4D4"/>
+                </a:solidFill>
+                <a:effectLst/>
+                <a:latin typeface="Consolas" panose="020B0609020204030204" pitchFamily="49" charset="0"/>
+              </a:rPr>
+              <a:t>ie</a:t>
+            </a:r>
+            <a:r>
+              <a:rPr lang="en-US" b="0" dirty="0">
+                <a:solidFill>
+                  <a:srgbClr val="D4D4D4"/>
+                </a:solidFill>
+                <a:effectLst/>
+                <a:latin typeface="Consolas" panose="020B0609020204030204" pitchFamily="49" charset="0"/>
+              </a:rPr>
+              <a:t>. energy is not on the same scale as minutes.</a:t>
+            </a:r>
+          </a:p>
+          <a:p>
+            <a:endParaRPr lang="en-US" dirty="0"/>
+          </a:p>
+        </p:txBody>
+      </p:sp>
+      <p:sp>
+        <p:nvSpPr>
+          <p:cNvPr id="4" name="Slide Number Placeholder 3"/>
+          <p:cNvSpPr>
+            <a:spLocks noGrp="1"/>
+          </p:cNvSpPr>
+          <p:nvPr>
+            <p:ph type="sldNum" sz="quarter" idx="5"/>
+          </p:nvPr>
+        </p:nvSpPr>
+        <p:spPr/>
+        <p:txBody>
+          <a:bodyPr/>
+          <a:lstStyle/>
+          <a:p>
+            <a:fld id="{5CD270A4-E417-1544-8D83-51C2B4F7CE0F}" type="slidenum">
+              <a:rPr lang="en-US" smtClean="0"/>
+              <a:t>7</a:t>
+            </a:fld>
+            <a:endParaRPr lang="en-US"/>
+          </a:p>
+        </p:txBody>
+      </p:sp>
+    </p:spTree>
+    <p:extLst>
+      <p:ext uri="{BB962C8B-B14F-4D97-AF65-F5344CB8AC3E}">
+        <p14:creationId xmlns:p14="http://schemas.microsoft.com/office/powerpoint/2010/main" val="3984030374"/>
+      </p:ext>
+    </p:extLst>
+  </p:cSld>
+  <p:clrMapOvr>
+    <a:masterClrMapping/>
+  </p:clrMapOvr>
+</p:notes>
+</file>
+
+<file path=ppt/notesSlides/notesSlide6.xml><?xml version="1.0" encoding="utf-8"?>
+<p:notes xmlns:a="http://schemas.openxmlformats.org/drawingml/2006/main" xmlns:r="http://schemas.openxmlformats.org/officeDocument/2006/relationships" xmlns:p="http://schemas.openxmlformats.org/presentationml/2006/main">
+  <p:cSld>
+    <p:spTree>
+      <p:nvGrpSpPr>
+        <p:cNvPr id="1" name=""/>
+        <p:cNvGrpSpPr/>
+        <p:nvPr/>
+      </p:nvGrpSpPr>
+      <p:grpSpPr>
+        <a:xfrm>
+          <a:off x="0" y="0"/>
+          <a:ext cx="0" cy="0"/>
+          <a:chOff x="0" y="0"/>
+          <a:chExt cx="0" cy="0"/>
+        </a:xfrm>
+      </p:grpSpPr>
+      <p:sp>
+        <p:nvSpPr>
+          <p:cNvPr id="2" name="Slide Image Placeholder 1"/>
+          <p:cNvSpPr>
+            <a:spLocks noGrp="1" noRot="1" noChangeAspect="1"/>
+          </p:cNvSpPr>
+          <p:nvPr>
+            <p:ph type="sldImg"/>
+          </p:nvPr>
+        </p:nvSpPr>
+        <p:spPr/>
+      </p:sp>
+      <p:sp>
+        <p:nvSpPr>
+          <p:cNvPr id="3" name="Notes Placeholder 2"/>
+          <p:cNvSpPr>
+            <a:spLocks noGrp="1"/>
+          </p:cNvSpPr>
+          <p:nvPr>
+            <p:ph type="body" idx="1"/>
+          </p:nvPr>
+        </p:nvSpPr>
+        <p:spPr/>
+        <p:txBody>
+          <a:bodyPr/>
+          <a:lstStyle/>
+          <a:p>
+            <a:r>
+              <a:rPr lang="en-US" dirty="0"/>
+              <a:t>For every model there is an accuracy score, the song attribute it thought was most important and it’s importance score</a:t>
+            </a:r>
+          </a:p>
+        </p:txBody>
+      </p:sp>
+      <p:sp>
+        <p:nvSpPr>
+          <p:cNvPr id="4" name="Slide Number Placeholder 3"/>
+          <p:cNvSpPr>
+            <a:spLocks noGrp="1"/>
+          </p:cNvSpPr>
+          <p:nvPr>
+            <p:ph type="sldNum" sz="quarter" idx="5"/>
+          </p:nvPr>
+        </p:nvSpPr>
+        <p:spPr/>
+        <p:txBody>
+          <a:bodyPr/>
+          <a:lstStyle/>
+          <a:p>
+            <a:fld id="{5CD270A4-E417-1544-8D83-51C2B4F7CE0F}" type="slidenum">
+              <a:rPr lang="en-US" smtClean="0"/>
+              <a:t>8</a:t>
+            </a:fld>
+            <a:endParaRPr lang="en-US"/>
+          </a:p>
+        </p:txBody>
+      </p:sp>
+    </p:spTree>
+    <p:extLst>
+      <p:ext uri="{BB962C8B-B14F-4D97-AF65-F5344CB8AC3E}">
+        <p14:creationId xmlns:p14="http://schemas.microsoft.com/office/powerpoint/2010/main" val="2673336111"/>
+      </p:ext>
+    </p:extLst>
+  </p:cSld>
+  <p:clrMapOvr>
+    <a:masterClrMapping/>
+  </p:clrMapOvr>
+</p:notes>
+</file>
+
+<file path=ppt/notesSlides/notesSlide7.xml><?xml version="1.0" encoding="utf-8"?>
+<p:notes xmlns:a="http://schemas.openxmlformats.org/drawingml/2006/main" xmlns:r="http://schemas.openxmlformats.org/officeDocument/2006/relationships" xmlns:p="http://schemas.openxmlformats.org/presentationml/2006/main">
+  <p:cSld>
+    <p:spTree>
+      <p:nvGrpSpPr>
+        <p:cNvPr id="1" name=""/>
+        <p:cNvGrpSpPr/>
+        <p:nvPr/>
+      </p:nvGrpSpPr>
+      <p:grpSpPr>
+        <a:xfrm>
+          <a:off x="0" y="0"/>
+          <a:ext cx="0" cy="0"/>
+          <a:chOff x="0" y="0"/>
+          <a:chExt cx="0" cy="0"/>
+        </a:xfrm>
+      </p:grpSpPr>
+      <p:sp>
+        <p:nvSpPr>
+          <p:cNvPr id="2" name="Slide Image Placeholder 1"/>
+          <p:cNvSpPr>
+            <a:spLocks noGrp="1" noRot="1" noChangeAspect="1"/>
+          </p:cNvSpPr>
+          <p:nvPr>
+            <p:ph type="sldImg"/>
+          </p:nvPr>
+        </p:nvSpPr>
+        <p:spPr/>
+      </p:sp>
+      <p:sp>
+        <p:nvSpPr>
+          <p:cNvPr id="3" name="Notes Placeholder 2"/>
+          <p:cNvSpPr>
+            <a:spLocks noGrp="1"/>
+          </p:cNvSpPr>
+          <p:nvPr>
+            <p:ph type="body" idx="1"/>
+          </p:nvPr>
+        </p:nvSpPr>
+        <p:spPr/>
+        <p:txBody>
+          <a:bodyPr/>
+          <a:lstStyle/>
+          <a:p>
+            <a:r>
+              <a:rPr lang="en-US" dirty="0"/>
+              <a:t>To solve the underfitting problem, I initially used a sample size of 100 and saw 99% accuracy scores which means we are overfitting, </a:t>
+            </a:r>
+          </a:p>
+          <a:p>
+            <a:r>
+              <a:rPr lang="en-US" dirty="0"/>
+              <a:t>but the real problem is the target, its continuous and doesn't have a normal distribution which is a problem when using models like </a:t>
+            </a:r>
+          </a:p>
+          <a:p>
+            <a:r>
+              <a:rPr lang="en-US" dirty="0"/>
+              <a:t>linear regression</a:t>
+            </a:r>
+          </a:p>
+        </p:txBody>
+      </p:sp>
+      <p:sp>
+        <p:nvSpPr>
+          <p:cNvPr id="4" name="Slide Number Placeholder 3"/>
+          <p:cNvSpPr>
+            <a:spLocks noGrp="1"/>
+          </p:cNvSpPr>
+          <p:nvPr>
+            <p:ph type="sldNum" sz="quarter" idx="5"/>
+          </p:nvPr>
+        </p:nvSpPr>
+        <p:spPr/>
+        <p:txBody>
+          <a:bodyPr/>
+          <a:lstStyle/>
+          <a:p>
+            <a:fld id="{5CD270A4-E417-1544-8D83-51C2B4F7CE0F}" type="slidenum">
+              <a:rPr lang="en-US" smtClean="0"/>
+              <a:t>13</a:t>
+            </a:fld>
+            <a:endParaRPr lang="en-US"/>
+          </a:p>
+        </p:txBody>
+      </p:sp>
+    </p:spTree>
+    <p:extLst>
+      <p:ext uri="{BB962C8B-B14F-4D97-AF65-F5344CB8AC3E}">
+        <p14:creationId xmlns:p14="http://schemas.microsoft.com/office/powerpoint/2010/main" val="2951639739"/>
+      </p:ext>
+    </p:extLst>
+  </p:cSld>
+  <p:clrMapOvr>
+    <a:masterClrMapping/>
+  </p:clrMapOvr>
+</p:notes>
+</file>
+
 <file path=ppt/slideLayouts/slideLayout1.xml><?xml version="1.0" encoding="utf-8"?>
 <p:sldLayout xmlns:a="http://schemas.openxmlformats.org/drawingml/2006/main" xmlns:r="http://schemas.openxmlformats.org/officeDocument/2006/relationships" xmlns:p="http://schemas.openxmlformats.org/presentationml/2006/main" preserve="1" userDrawn="1">
   <p:cSld name="Two Content">
@@ -7083,7 +7800,7 @@
           <a:p>
             <a:fld id="{D386965C-165C-764D-B490-A5796C92088F}" type="datetimeFigureOut">
               <a:rPr lang="en-US" smtClean="0"/>
-              <a:t>4/6/2023</a:t>
+              <a:t>4/14/2023</a:t>
             </a:fld>
             <a:endParaRPr lang="en-US"/>
           </a:p>
@@ -7585,14 +8302,6 @@
 <file path=ppt/slides/slide10.xml><?xml version="1.0" encoding="utf-8"?>
 <p:sld xmlns:a="http://schemas.openxmlformats.org/drawingml/2006/main" xmlns:r="http://schemas.openxmlformats.org/officeDocument/2006/relationships" xmlns:p="http://schemas.openxmlformats.org/presentationml/2006/main">
   <p:cSld>
-    <p:bg>
-      <p:bgPr>
-        <a:solidFill>
-          <a:schemeClr val="bg1"/>
-        </a:solidFill>
-        <a:effectLst/>
-      </p:bgPr>
-    </p:bg>
     <p:spTree>
       <p:nvGrpSpPr>
         <p:cNvPr id="1" name=""/>
@@ -7609,76 +8318,10 @@
       </p:grpSpPr>
       <p:sp>
         <p:nvSpPr>
-          <p:cNvPr id="11" name="Down Arrow 7">
-            <a:extLst>
-              <a:ext uri="{FF2B5EF4-FFF2-40B4-BE49-F238E27FC236}">
-                <a16:creationId xmlns:a16="http://schemas.microsoft.com/office/drawing/2014/main" id="{D4771268-CB57-404A-9271-370EB28F6090}"/>
-              </a:ext>
-              <a:ext uri="{C183D7F6-B498-43B3-948B-1728B52AA6E4}">
-                <adec:decorative xmlns:adec="http://schemas.microsoft.com/office/drawing/2017/decorative" val="1"/>
-              </a:ext>
-            </a:extLst>
-          </p:cNvPr>
-          <p:cNvSpPr>
-            <a:spLocks noGrp="1" noRot="1" noChangeAspect="1" noMove="1" noResize="1" noEditPoints="1" noAdjustHandles="1" noChangeArrowheads="1" noChangeShapeType="1" noTextEdit="1"/>
-          </p:cNvSpPr>
-          <p:nvPr>
-            <p:extLst>
-              <p:ext uri="{386F3935-93C4-4BCD-93E2-E3B085C9AB24}">
-                <p16:designElem xmlns:p16="http://schemas.microsoft.com/office/powerpoint/2015/main" val="1"/>
-              </p:ext>
-            </p:extLst>
-          </p:nvPr>
-        </p:nvSpPr>
-        <p:spPr>
-          <a:xfrm rot="16200000">
-            <a:off x="800100" y="1491343"/>
-            <a:ext cx="3333749" cy="3499103"/>
-          </a:xfrm>
-          <a:prstGeom prst="downArrow">
-            <a:avLst>
-              <a:gd name="adj1" fmla="val 100000"/>
-              <a:gd name="adj2" fmla="val 15788"/>
-            </a:avLst>
-          </a:prstGeom>
-          <a:solidFill>
-            <a:srgbClr val="404040"/>
-          </a:solidFill>
-          <a:ln w="53975">
-            <a:noFill/>
-          </a:ln>
-        </p:spPr>
-        <p:style>
-          <a:lnRef idx="2">
-            <a:schemeClr val="accent1">
-              <a:shade val="50000"/>
-            </a:schemeClr>
-          </a:lnRef>
-          <a:fillRef idx="1">
-            <a:schemeClr val="accent1"/>
-          </a:fillRef>
-          <a:effectRef idx="0">
-            <a:schemeClr val="accent1"/>
-          </a:effectRef>
-          <a:fontRef idx="minor">
-            <a:schemeClr val="lt1"/>
-          </a:fontRef>
-        </p:style>
-        <p:txBody>
-          <a:bodyPr rtlCol="0" anchor="ctr"/>
-          <a:lstStyle/>
-          <a:p>
-            <a:pPr algn="ctr"/>
-            <a:endParaRPr lang="en-US"/>
-          </a:p>
-        </p:txBody>
-      </p:sp>
-      <p:sp>
-        <p:nvSpPr>
           <p:cNvPr id="2" name="Title 1">
             <a:extLst>
               <a:ext uri="{FF2B5EF4-FFF2-40B4-BE49-F238E27FC236}">
-                <a16:creationId xmlns:a16="http://schemas.microsoft.com/office/drawing/2014/main" id="{F6F8B694-0C90-CE32-B027-0FDD7110C93A}"/>
+                <a16:creationId xmlns:a16="http://schemas.microsoft.com/office/drawing/2014/main" id="{81CA69EC-F1B5-22B8-6ABB-0865454D2CCD}"/>
               </a:ext>
             </a:extLst>
           </p:cNvPr>
@@ -7689,44 +8332,54 @@
             <p:ph type="title"/>
           </p:nvPr>
         </p:nvSpPr>
-        <p:spPr>
-          <a:xfrm>
-            <a:off x="1028700" y="1967266"/>
-            <a:ext cx="2628900" cy="2547257"/>
-          </a:xfrm>
-          <a:noFill/>
-        </p:spPr>
+        <p:spPr/>
         <p:txBody>
-          <a:bodyPr vert="horz" lIns="91440" tIns="45720" rIns="91440" bIns="45720" rtlCol="0" anchor="ctr">
-            <a:normAutofit/>
+          <a:bodyPr>
+            <a:normAutofit fontScale="90000"/>
           </a:bodyPr>
           <a:lstStyle/>
           <a:p>
-            <a:pPr algn="ctr">
-              <a:lnSpc>
-                <a:spcPct val="90000"/>
-              </a:lnSpc>
-            </a:pPr>
-            <a:r>
-              <a:rPr lang="en-US" sz="3600" kern="1200">
-                <a:solidFill>
-                  <a:srgbClr val="FFFFFF"/>
-                </a:solidFill>
-                <a:latin typeface="+mj-lt"/>
-                <a:ea typeface="+mj-ea"/>
-                <a:cs typeface="+mj-cs"/>
-              </a:rPr>
-              <a:t>Model Selection Continued</a:t>
+            <a:r>
+              <a:rPr lang="en-US" dirty="0"/>
+              <a:t>Model Evaluation</a:t>
+            </a:r>
+          </a:p>
+        </p:txBody>
+      </p:sp>
+      <p:sp>
+        <p:nvSpPr>
+          <p:cNvPr id="4" name="Text Placeholder 3">
+            <a:extLst>
+              <a:ext uri="{FF2B5EF4-FFF2-40B4-BE49-F238E27FC236}">
+                <a16:creationId xmlns:a16="http://schemas.microsoft.com/office/drawing/2014/main" id="{920BFA18-D94A-37F5-EE77-E17015F9F15B}"/>
+              </a:ext>
+            </a:extLst>
+          </p:cNvPr>
+          <p:cNvSpPr>
+            <a:spLocks noGrp="1"/>
+          </p:cNvSpPr>
+          <p:nvPr>
+            <p:ph type="body" idx="11"/>
+          </p:nvPr>
+        </p:nvSpPr>
+        <p:spPr/>
+        <p:txBody>
+          <a:bodyPr/>
+          <a:lstStyle/>
+          <a:p>
+            <a:r>
+              <a:rPr lang="en-US" dirty="0"/>
+              <a:t>Cross Validated Mean Accuracy Score</a:t>
             </a:r>
           </a:p>
         </p:txBody>
       </p:sp>
       <p:pic>
         <p:nvPicPr>
-          <p:cNvPr id="6" name="Picture 5" descr="Chart, bar chart, histogram&#10;&#10;Description automatically generated">
-            <a:extLst>
-              <a:ext uri="{FF2B5EF4-FFF2-40B4-BE49-F238E27FC236}">
-                <a16:creationId xmlns:a16="http://schemas.microsoft.com/office/drawing/2014/main" id="{07ED4E35-E93B-52B8-260E-96E996BE111C}"/>
+          <p:cNvPr id="5" name="Picture 4" descr="Graphical user interface&#10;&#10;Description automatically generated">
+            <a:extLst>
+              <a:ext uri="{FF2B5EF4-FFF2-40B4-BE49-F238E27FC236}">
+                <a16:creationId xmlns:a16="http://schemas.microsoft.com/office/drawing/2014/main" id="{03C18BCE-7EA3-661B-D419-DD68FCEA2D9E}"/>
               </a:ext>
             </a:extLst>
           </p:cNvPr>
@@ -7743,18 +8396,67 @@
         </p:blipFill>
         <p:spPr>
           <a:xfrm>
-            <a:off x="5244113" y="854109"/>
-            <a:ext cx="6947887" cy="5888334"/>
+            <a:off x="3400230" y="3662557"/>
+            <a:ext cx="4753638" cy="1286054"/>
           </a:xfrm>
           <a:prstGeom prst="rect">
             <a:avLst/>
           </a:prstGeom>
         </p:spPr>
       </p:pic>
+      <p:sp>
+        <p:nvSpPr>
+          <p:cNvPr id="7" name="Text Placeholder 2">
+            <a:extLst>
+              <a:ext uri="{FF2B5EF4-FFF2-40B4-BE49-F238E27FC236}">
+                <a16:creationId xmlns:a16="http://schemas.microsoft.com/office/drawing/2014/main" id="{D68AA1D5-6C2C-5A64-3172-D3D7A80C37F5}"/>
+              </a:ext>
+            </a:extLst>
+          </p:cNvPr>
+          <p:cNvSpPr>
+            <a:spLocks noGrp="1"/>
+          </p:cNvSpPr>
+          <p:nvPr>
+            <p:ph type="body" idx="1"/>
+          </p:nvPr>
+        </p:nvSpPr>
+        <p:spPr>
+          <a:xfrm>
+            <a:off x="711929" y="1672180"/>
+            <a:ext cx="10130241" cy="1905033"/>
+          </a:xfrm>
+        </p:spPr>
+        <p:txBody>
+          <a:bodyPr/>
+          <a:lstStyle/>
+          <a:p>
+            <a:pPr>
+              <a:lnSpc>
+                <a:spcPct val="100000"/>
+              </a:lnSpc>
+            </a:pPr>
+            <a:r>
+              <a:rPr lang="en-US" dirty="0"/>
+              <a:t>Select the top three performing models via accuracy and </a:t>
+            </a:r>
+          </a:p>
+          <a:p>
+            <a:pPr>
+              <a:lnSpc>
+                <a:spcPct val="100000"/>
+              </a:lnSpc>
+            </a:pPr>
+            <a:r>
+              <a:rPr lang="en-US" dirty="0"/>
+              <a:t>Run a cross validated mean accuracy score. The result is the same for all three models. </a:t>
+            </a:r>
+          </a:p>
+        </p:txBody>
+      </p:sp>
     </p:spTree>
     <p:extLst>
       <p:ext uri="{BB962C8B-B14F-4D97-AF65-F5344CB8AC3E}">
-        <p14:creationId xmlns:p14="http://schemas.microsoft.com/office/powerpoint/2010/main" val="2089948446"/>
+        <p14:creationId xmlns:p14="http://schemas.microsoft.com/office/powerpoint/2010/main" val="3978180021"/>
       </p:ext>
     </p:extLst>
   </p:cSld>
@@ -7786,7 +8488,7 @@
           <p:cNvPr id="2" name="Title 1">
             <a:extLst>
               <a:ext uri="{FF2B5EF4-FFF2-40B4-BE49-F238E27FC236}">
-                <a16:creationId xmlns:a16="http://schemas.microsoft.com/office/drawing/2014/main" id="{81CA69EC-F1B5-22B8-6ABB-0865454D2CCD}"/>
+                <a16:creationId xmlns:a16="http://schemas.microsoft.com/office/drawing/2014/main" id="{330546F8-E18D-52FB-58B3-D03D86D3B758}"/>
               </a:ext>
             </a:extLst>
           </p:cNvPr>
@@ -7805,18 +8507,22 @@
           <a:lstStyle/>
           <a:p>
             <a:r>
+              <a:rPr lang="en-US" dirty="0" err="1"/>
+              <a:t>HyperParameter</a:t>
+            </a:r>
+            <a:r>
               <a:rPr lang="en-US" dirty="0"/>
-              <a:t>Model Evaluation</a:t>
+              <a:t> Tuning</a:t>
             </a:r>
           </a:p>
         </p:txBody>
       </p:sp>
       <p:sp>
         <p:nvSpPr>
-          <p:cNvPr id="4" name="Text Placeholder 3">
-            <a:extLst>
-              <a:ext uri="{FF2B5EF4-FFF2-40B4-BE49-F238E27FC236}">
-                <a16:creationId xmlns:a16="http://schemas.microsoft.com/office/drawing/2014/main" id="{920BFA18-D94A-37F5-EE77-E17015F9F15B}"/>
+          <p:cNvPr id="3" name="Text Placeholder 2">
+            <a:extLst>
+              <a:ext uri="{FF2B5EF4-FFF2-40B4-BE49-F238E27FC236}">
+                <a16:creationId xmlns:a16="http://schemas.microsoft.com/office/drawing/2014/main" id="{9D953DAE-FB0D-410E-2261-447D3E04B4BB}"/>
               </a:ext>
             </a:extLst>
           </p:cNvPr>
@@ -7824,7 +8530,7 @@
             <a:spLocks noGrp="1"/>
           </p:cNvSpPr>
           <p:nvPr>
-            <p:ph type="body" idx="11"/>
+            <p:ph type="body" idx="1"/>
           </p:nvPr>
         </p:nvSpPr>
         <p:spPr/>
@@ -7834,47 +8540,25 @@
           <a:p>
             <a:r>
               <a:rPr lang="en-US" dirty="0"/>
-              <a:t>Cross Validated Mean Accuracy Score</a:t>
+              <a:t>I selected the top two models, Decision Tree Regressor and Random Forest Regressor model, ran </a:t>
+            </a:r>
+            <a:r>
+              <a:rPr lang="en-US" dirty="0" err="1"/>
+              <a:t>GridSearchCV</a:t>
+            </a:r>
+            <a:r>
+              <a:rPr lang="en-US" dirty="0"/>
+              <a:t> and found no performance gains when running the training set data with optimal parameter settings. </a:t>
             </a:r>
           </a:p>
         </p:txBody>
       </p:sp>
-      <p:pic>
-        <p:nvPicPr>
-          <p:cNvPr id="5" name="Picture 4" descr="Graphical user interface&#10;&#10;Description automatically generated">
-            <a:extLst>
-              <a:ext uri="{FF2B5EF4-FFF2-40B4-BE49-F238E27FC236}">
-                <a16:creationId xmlns:a16="http://schemas.microsoft.com/office/drawing/2014/main" id="{03C18BCE-7EA3-661B-D419-DD68FCEA2D9E}"/>
-              </a:ext>
-            </a:extLst>
-          </p:cNvPr>
-          <p:cNvPicPr>
-            <a:picLocks noChangeAspect="1"/>
-          </p:cNvPicPr>
-          <p:nvPr/>
-        </p:nvPicPr>
-        <p:blipFill>
-          <a:blip r:embed="rId2"/>
-          <a:stretch>
-            <a:fillRect/>
-          </a:stretch>
-        </p:blipFill>
-        <p:spPr>
-          <a:xfrm>
-            <a:off x="3400230" y="3662557"/>
-            <a:ext cx="4753638" cy="1286054"/>
-          </a:xfrm>
-          <a:prstGeom prst="rect">
-            <a:avLst/>
-          </a:prstGeom>
-        </p:spPr>
-      </p:pic>
-      <p:sp>
-        <p:nvSpPr>
-          <p:cNvPr id="7" name="Text Placeholder 2">
-            <a:extLst>
-              <a:ext uri="{FF2B5EF4-FFF2-40B4-BE49-F238E27FC236}">
-                <a16:creationId xmlns:a16="http://schemas.microsoft.com/office/drawing/2014/main" id="{D68AA1D5-6C2C-5A64-3172-D3D7A80C37F5}"/>
+      <p:sp>
+        <p:nvSpPr>
+          <p:cNvPr id="4" name="Text Placeholder 3">
+            <a:extLst>
+              <a:ext uri="{FF2B5EF4-FFF2-40B4-BE49-F238E27FC236}">
+                <a16:creationId xmlns:a16="http://schemas.microsoft.com/office/drawing/2014/main" id="{C5F33880-A866-D823-FF29-4CEEAC8C1A3E}"/>
               </a:ext>
             </a:extLst>
           </p:cNvPr>
@@ -7882,46 +8566,22 @@
             <a:spLocks noGrp="1"/>
           </p:cNvSpPr>
           <p:nvPr>
-            <p:ph type="body" idx="1"/>
-          </p:nvPr>
-        </p:nvSpPr>
-        <p:spPr>
-          <a:xfrm>
-            <a:off x="711929" y="1672180"/>
-            <a:ext cx="10130241" cy="1905033"/>
-          </a:xfrm>
-        </p:spPr>
+            <p:ph type="body" idx="11"/>
+          </p:nvPr>
+        </p:nvSpPr>
+        <p:spPr/>
         <p:txBody>
           <a:bodyPr/>
           <a:lstStyle/>
           <a:p>
-            <a:pPr>
-              <a:lnSpc>
-                <a:spcPct val="100000"/>
-              </a:lnSpc>
-            </a:pPr>
-            <a:r>
-              <a:rPr lang="en-US" dirty="0"/>
-              <a:t>Select the top three performing models via accuracy and </a:t>
-            </a:r>
-          </a:p>
-          <a:p>
-            <a:pPr>
-              <a:lnSpc>
-                <a:spcPct val="100000"/>
-              </a:lnSpc>
-            </a:pPr>
-            <a:r>
-              <a:rPr lang="en-US" dirty="0"/>
-              <a:t>Run a cross validated mean accuracy score. The result is the same for all three models. </a:t>
-            </a:r>
+            <a:endParaRPr lang="en-US" dirty="0"/>
           </a:p>
         </p:txBody>
       </p:sp>
     </p:spTree>
     <p:extLst>
       <p:ext uri="{BB962C8B-B14F-4D97-AF65-F5344CB8AC3E}">
-        <p14:creationId xmlns:p14="http://schemas.microsoft.com/office/powerpoint/2010/main" val="3978180021"/>
+        <p14:creationId xmlns:p14="http://schemas.microsoft.com/office/powerpoint/2010/main" val="2450242446"/>
       </p:ext>
     </p:extLst>
   </p:cSld>
@@ -7953,7 +8613,7 @@
           <p:cNvPr id="2" name="Title 1">
             <a:extLst>
               <a:ext uri="{FF2B5EF4-FFF2-40B4-BE49-F238E27FC236}">
-                <a16:creationId xmlns:a16="http://schemas.microsoft.com/office/drawing/2014/main" id="{330546F8-E18D-52FB-58B3-D03D86D3B758}"/>
+                <a16:creationId xmlns:a16="http://schemas.microsoft.com/office/drawing/2014/main" id="{3F74C0BE-0683-B140-97D0-062BB48C2E6B}"/>
               </a:ext>
             </a:extLst>
           </p:cNvPr>
@@ -7962,40 +8622,6 @@
           </p:cNvSpPr>
           <p:nvPr>
             <p:ph type="title"/>
-          </p:nvPr>
-        </p:nvSpPr>
-        <p:spPr/>
-        <p:txBody>
-          <a:bodyPr>
-            <a:normAutofit fontScale="90000"/>
-          </a:bodyPr>
-          <a:lstStyle/>
-          <a:p>
-            <a:r>
-              <a:rPr lang="en-US" dirty="0" err="1"/>
-              <a:t>HyperParameter</a:t>
-            </a:r>
-            <a:r>
-              <a:rPr lang="en-US" dirty="0"/>
-              <a:t> Tuning</a:t>
-            </a:r>
-          </a:p>
-        </p:txBody>
-      </p:sp>
-      <p:sp>
-        <p:nvSpPr>
-          <p:cNvPr id="3" name="Text Placeholder 2">
-            <a:extLst>
-              <a:ext uri="{FF2B5EF4-FFF2-40B4-BE49-F238E27FC236}">
-                <a16:creationId xmlns:a16="http://schemas.microsoft.com/office/drawing/2014/main" id="{9D953DAE-FB0D-410E-2261-447D3E04B4BB}"/>
-              </a:ext>
-            </a:extLst>
-          </p:cNvPr>
-          <p:cNvSpPr>
-            <a:spLocks noGrp="1"/>
-          </p:cNvSpPr>
-          <p:nvPr>
-            <p:ph type="body" idx="1"/>
           </p:nvPr>
         </p:nvSpPr>
         <p:spPr/>
@@ -8005,25 +8631,17 @@
           <a:p>
             <a:r>
               <a:rPr lang="en-US" dirty="0"/>
-              <a:t>I selected the top two models, Decision Tree Regressor and Random Forest Regressor model, ran </a:t>
-            </a:r>
-            <a:r>
-              <a:rPr lang="en-US" dirty="0" err="1"/>
-              <a:t>GridSearchCV</a:t>
-            </a:r>
-            <a:r>
-              <a:rPr lang="en-US" dirty="0"/>
-              <a:t> and found no performance gains when running the training set data with optimal parameter settings. </a:t>
+              <a:t>Final Prediction of Position Target</a:t>
             </a:r>
           </a:p>
         </p:txBody>
       </p:sp>
       <p:sp>
         <p:nvSpPr>
-          <p:cNvPr id="4" name="Text Placeholder 3">
-            <a:extLst>
-              <a:ext uri="{FF2B5EF4-FFF2-40B4-BE49-F238E27FC236}">
-                <a16:creationId xmlns:a16="http://schemas.microsoft.com/office/drawing/2014/main" id="{C5F33880-A866-D823-FF29-4CEEAC8C1A3E}"/>
+          <p:cNvPr id="3" name="Text Placeholder 2">
+            <a:extLst>
+              <a:ext uri="{FF2B5EF4-FFF2-40B4-BE49-F238E27FC236}">
+                <a16:creationId xmlns:a16="http://schemas.microsoft.com/office/drawing/2014/main" id="{5C1ACD2B-9887-0A4F-A947-A39F3A46A771}"/>
               </a:ext>
             </a:extLst>
           </p:cNvPr>
@@ -8031,22 +8649,64 @@
             <a:spLocks noGrp="1"/>
           </p:cNvSpPr>
           <p:nvPr>
-            <p:ph type="body" idx="11"/>
-          </p:nvPr>
-        </p:nvSpPr>
-        <p:spPr/>
+            <p:ph type="body" idx="1"/>
+          </p:nvPr>
+        </p:nvSpPr>
+        <p:spPr>
+          <a:xfrm>
+            <a:off x="711929" y="1672180"/>
+            <a:ext cx="6884625" cy="1955275"/>
+          </a:xfrm>
+        </p:spPr>
         <p:txBody>
           <a:bodyPr/>
           <a:lstStyle/>
           <a:p>
-            <a:endParaRPr lang="en-US" dirty="0"/>
+            <a:r>
+              <a:rPr lang="en-US" dirty="0">
+                <a:solidFill>
+                  <a:schemeClr val="tx2"/>
+                </a:solidFill>
+              </a:rPr>
+              <a:t>Acousticness was the top predictor in determining a songs popularity which also follows the outputs we got from the training data.</a:t>
+            </a:r>
           </a:p>
         </p:txBody>
       </p:sp>
+      <p:pic>
+        <p:nvPicPr>
+          <p:cNvPr id="5" name="Picture 4" descr="Graphical user interface, application&#10;&#10;Description automatically generated">
+            <a:extLst>
+              <a:ext uri="{FF2B5EF4-FFF2-40B4-BE49-F238E27FC236}">
+                <a16:creationId xmlns:a16="http://schemas.microsoft.com/office/drawing/2014/main" id="{92041B07-8E25-430A-94F9-1054B8910087}"/>
+              </a:ext>
+            </a:extLst>
+          </p:cNvPr>
+          <p:cNvPicPr>
+            <a:picLocks noChangeAspect="1"/>
+          </p:cNvPicPr>
+          <p:nvPr/>
+        </p:nvPicPr>
+        <p:blipFill>
+          <a:blip r:embed="rId2"/>
+          <a:stretch>
+            <a:fillRect/>
+          </a:stretch>
+        </p:blipFill>
+        <p:spPr>
+          <a:xfrm>
+            <a:off x="8324128" y="1740078"/>
+            <a:ext cx="2838846" cy="3943900"/>
+          </a:xfrm>
+          <a:prstGeom prst="rect">
+            <a:avLst/>
+          </a:prstGeom>
+        </p:spPr>
+      </p:pic>
     </p:spTree>
     <p:extLst>
       <p:ext uri="{BB962C8B-B14F-4D97-AF65-F5344CB8AC3E}">
-        <p14:creationId xmlns:p14="http://schemas.microsoft.com/office/powerpoint/2010/main" val="2450242446"/>
+        <p14:creationId xmlns:p14="http://schemas.microsoft.com/office/powerpoint/2010/main" val="2409348699"/>
       </p:ext>
     </p:extLst>
   </p:cSld>
@@ -8078,7 +8738,7 @@
           <p:cNvPr id="2" name="Title 1">
             <a:extLst>
               <a:ext uri="{FF2B5EF4-FFF2-40B4-BE49-F238E27FC236}">
-                <a16:creationId xmlns:a16="http://schemas.microsoft.com/office/drawing/2014/main" id="{3F74C0BE-0683-B140-97D0-062BB48C2E6B}"/>
+                <a16:creationId xmlns:a16="http://schemas.microsoft.com/office/drawing/2014/main" id="{BF70BEA6-6A0D-C64A-BD71-FFD27AA560FE}"/>
               </a:ext>
             </a:extLst>
           </p:cNvPr>
@@ -8096,17 +8756,17 @@
           <a:p>
             <a:r>
               <a:rPr lang="en-US" dirty="0"/>
-              <a:t>Final Prediction of Position Target</a:t>
+              <a:t>Conclusion</a:t>
             </a:r>
           </a:p>
         </p:txBody>
       </p:sp>
       <p:sp>
         <p:nvSpPr>
-          <p:cNvPr id="3" name="Text Placeholder 2">
-            <a:extLst>
-              <a:ext uri="{FF2B5EF4-FFF2-40B4-BE49-F238E27FC236}">
-                <a16:creationId xmlns:a16="http://schemas.microsoft.com/office/drawing/2014/main" id="{5C1ACD2B-9887-0A4F-A947-A39F3A46A771}"/>
+          <p:cNvPr id="4" name="Text Placeholder 3">
+            <a:extLst>
+              <a:ext uri="{FF2B5EF4-FFF2-40B4-BE49-F238E27FC236}">
+                <a16:creationId xmlns:a16="http://schemas.microsoft.com/office/drawing/2014/main" id="{F40A9A4C-FCFA-754C-9375-C8E7F863AB67}"/>
               </a:ext>
             </a:extLst>
           </p:cNvPr>
@@ -8114,13 +8774,13 @@
             <a:spLocks noGrp="1"/>
           </p:cNvSpPr>
           <p:nvPr>
-            <p:ph type="body" idx="1"/>
-          </p:nvPr>
-        </p:nvSpPr>
-        <p:spPr>
-          <a:xfrm>
-            <a:off x="711929" y="1672180"/>
-            <a:ext cx="6884625" cy="4079696"/>
+            <p:ph type="body" idx="10"/>
+          </p:nvPr>
+        </p:nvSpPr>
+        <p:spPr>
+          <a:xfrm>
+            <a:off x="1667951" y="1389152"/>
+            <a:ext cx="8723474" cy="4079696"/>
           </a:xfrm>
         </p:spPr>
         <p:txBody>
@@ -8133,45 +8793,15 @@
                   <a:schemeClr val="tx2"/>
                 </a:solidFill>
               </a:rPr>
-              <a:t>With running the test dataset. Acousticness was the top predictor in determining a songs popularity which also follows the outputs we got from the training data.</a:t>
+              <a:t>In conclusion with the results from the modeling we don’t have strong evidence to suggest that the features listed from a song play an important factor when a song is chosen for its popularity, we are no better than guessing and it’s mostly likely due to underfitting where we cannot capture the complex relationship properly between the inputs and outputs accurately. If we were to include the popularity field from Spotify as our target, the results would have been better. It was interesting to see what models predicted its own feature importance.</a:t>
             </a:r>
           </a:p>
         </p:txBody>
       </p:sp>
-      <p:pic>
-        <p:nvPicPr>
-          <p:cNvPr id="5" name="Picture 4" descr="Graphical user interface, application&#10;&#10;Description automatically generated">
-            <a:extLst>
-              <a:ext uri="{FF2B5EF4-FFF2-40B4-BE49-F238E27FC236}">
-                <a16:creationId xmlns:a16="http://schemas.microsoft.com/office/drawing/2014/main" id="{92041B07-8E25-430A-94F9-1054B8910087}"/>
-              </a:ext>
-            </a:extLst>
-          </p:cNvPr>
-          <p:cNvPicPr>
-            <a:picLocks noChangeAspect="1"/>
-          </p:cNvPicPr>
-          <p:nvPr/>
-        </p:nvPicPr>
-        <p:blipFill>
-          <a:blip r:embed="rId2"/>
-          <a:stretch>
-            <a:fillRect/>
-          </a:stretch>
-        </p:blipFill>
-        <p:spPr>
-          <a:xfrm>
-            <a:off x="8324128" y="1740078"/>
-            <a:ext cx="2838846" cy="3943900"/>
-          </a:xfrm>
-          <a:prstGeom prst="rect">
-            <a:avLst/>
-          </a:prstGeom>
-        </p:spPr>
-      </p:pic>
     </p:spTree>
     <p:extLst>
       <p:ext uri="{BB962C8B-B14F-4D97-AF65-F5344CB8AC3E}">
-        <p14:creationId xmlns:p14="http://schemas.microsoft.com/office/powerpoint/2010/main" val="2409348699"/>
+        <p14:creationId xmlns:p14="http://schemas.microsoft.com/office/powerpoint/2010/main" val="4051248754"/>
       </p:ext>
     </p:extLst>
   </p:cSld>
@@ -8203,7 +8833,7 @@
           <p:cNvPr id="2" name="Title 1">
             <a:extLst>
               <a:ext uri="{FF2B5EF4-FFF2-40B4-BE49-F238E27FC236}">
-                <a16:creationId xmlns:a16="http://schemas.microsoft.com/office/drawing/2014/main" id="{BF70BEA6-6A0D-C64A-BD71-FFD27AA560FE}"/>
+                <a16:creationId xmlns:a16="http://schemas.microsoft.com/office/drawing/2014/main" id="{73651502-26B8-2141-A3C9-CD6BEAF631CE}"/>
               </a:ext>
             </a:extLst>
           </p:cNvPr>
@@ -8221,52 +8851,53 @@
           <a:p>
             <a:r>
               <a:rPr lang="en-US" dirty="0"/>
-              <a:t>Conclusion</a:t>
+              <a:t>Explainable AI with </a:t>
+            </a:r>
+            <a:r>
+              <a:rPr lang="en-US" dirty="0" err="1"/>
+              <a:t>shap</a:t>
+            </a:r>
+            <a:r>
+              <a:rPr lang="en-US" dirty="0"/>
+              <a:t> package</a:t>
             </a:r>
           </a:p>
         </p:txBody>
       </p:sp>
-      <p:sp>
-        <p:nvSpPr>
-          <p:cNvPr id="4" name="Text Placeholder 3">
-            <a:extLst>
-              <a:ext uri="{FF2B5EF4-FFF2-40B4-BE49-F238E27FC236}">
-                <a16:creationId xmlns:a16="http://schemas.microsoft.com/office/drawing/2014/main" id="{F40A9A4C-FCFA-754C-9375-C8E7F863AB67}"/>
-              </a:ext>
-            </a:extLst>
-          </p:cNvPr>
-          <p:cNvSpPr>
-            <a:spLocks noGrp="1"/>
-          </p:cNvSpPr>
-          <p:nvPr>
-            <p:ph type="body" idx="10"/>
-          </p:nvPr>
-        </p:nvSpPr>
-        <p:spPr>
-          <a:xfrm>
-            <a:off x="1667951" y="1389152"/>
-            <a:ext cx="8723474" cy="4079696"/>
-          </a:xfrm>
-        </p:spPr>
-        <p:txBody>
-          <a:bodyPr/>
-          <a:lstStyle/>
-          <a:p>
-            <a:r>
-              <a:rPr lang="en-US" dirty="0">
-                <a:solidFill>
-                  <a:schemeClr val="tx2"/>
-                </a:solidFill>
-              </a:rPr>
-              <a:t>In conclusion with the results from the modeling we don’t have strong evidence to suggest that the features listed from a song play an important factor when a song is chosen for its popularity, we are no better than guessing and it’s mostly likely due to underfitting where we cannot capture the relationship properly between the inputs and outputs accurately. If we were to include the popularity field from Spotify as our target, the results would have been better. It was interesting to see what models predicted its own feature importance.</a:t>
-            </a:r>
-          </a:p>
-        </p:txBody>
-      </p:sp>
+      <p:pic>
+        <p:nvPicPr>
+          <p:cNvPr id="6" name="Picture 5" descr="Chart&#10;&#10;Description automatically generated">
+            <a:extLst>
+              <a:ext uri="{FF2B5EF4-FFF2-40B4-BE49-F238E27FC236}">
+                <a16:creationId xmlns:a16="http://schemas.microsoft.com/office/drawing/2014/main" id="{1CC31AC4-AC8A-F745-0804-9983C589CE36}"/>
+              </a:ext>
+            </a:extLst>
+          </p:cNvPr>
+          <p:cNvPicPr>
+            <a:picLocks noChangeAspect="1"/>
+          </p:cNvPicPr>
+          <p:nvPr/>
+        </p:nvPicPr>
+        <p:blipFill>
+          <a:blip r:embed="rId2"/>
+          <a:stretch>
+            <a:fillRect/>
+          </a:stretch>
+        </p:blipFill>
+        <p:spPr>
+          <a:xfrm>
+            <a:off x="3124866" y="1609219"/>
+            <a:ext cx="4793235" cy="4978958"/>
+          </a:xfrm>
+          <a:prstGeom prst="rect">
+            <a:avLst/>
+          </a:prstGeom>
+        </p:spPr>
+      </p:pic>
     </p:spTree>
     <p:extLst>
       <p:ext uri="{BB962C8B-B14F-4D97-AF65-F5344CB8AC3E}">
-        <p14:creationId xmlns:p14="http://schemas.microsoft.com/office/powerpoint/2010/main" val="4051248754"/>
+        <p14:creationId xmlns:p14="http://schemas.microsoft.com/office/powerpoint/2010/main" val="24590043"/>
       </p:ext>
     </p:extLst>
   </p:cSld>
@@ -8298,102 +8929,6 @@
           <p:cNvPr id="2" name="Title 1">
             <a:extLst>
               <a:ext uri="{FF2B5EF4-FFF2-40B4-BE49-F238E27FC236}">
-                <a16:creationId xmlns:a16="http://schemas.microsoft.com/office/drawing/2014/main" id="{73651502-26B8-2141-A3C9-CD6BEAF631CE}"/>
-              </a:ext>
-            </a:extLst>
-          </p:cNvPr>
-          <p:cNvSpPr>
-            <a:spLocks noGrp="1"/>
-          </p:cNvSpPr>
-          <p:nvPr>
-            <p:ph type="title"/>
-          </p:nvPr>
-        </p:nvSpPr>
-        <p:spPr/>
-        <p:txBody>
-          <a:bodyPr/>
-          <a:lstStyle/>
-          <a:p>
-            <a:r>
-              <a:rPr lang="en-US" dirty="0"/>
-              <a:t>Explainable AI with </a:t>
-            </a:r>
-            <a:r>
-              <a:rPr lang="en-US" dirty="0" err="1"/>
-              <a:t>shap</a:t>
-            </a:r>
-            <a:r>
-              <a:rPr lang="en-US" dirty="0"/>
-              <a:t> package</a:t>
-            </a:r>
-          </a:p>
-        </p:txBody>
-      </p:sp>
-      <p:pic>
-        <p:nvPicPr>
-          <p:cNvPr id="6" name="Picture 5" descr="Chart&#10;&#10;Description automatically generated">
-            <a:extLst>
-              <a:ext uri="{FF2B5EF4-FFF2-40B4-BE49-F238E27FC236}">
-                <a16:creationId xmlns:a16="http://schemas.microsoft.com/office/drawing/2014/main" id="{1CC31AC4-AC8A-F745-0804-9983C589CE36}"/>
-              </a:ext>
-            </a:extLst>
-          </p:cNvPr>
-          <p:cNvPicPr>
-            <a:picLocks noChangeAspect="1"/>
-          </p:cNvPicPr>
-          <p:nvPr/>
-        </p:nvPicPr>
-        <p:blipFill>
-          <a:blip r:embed="rId2"/>
-          <a:stretch>
-            <a:fillRect/>
-          </a:stretch>
-        </p:blipFill>
-        <p:spPr>
-          <a:xfrm>
-            <a:off x="3124866" y="1609219"/>
-            <a:ext cx="4793235" cy="4978958"/>
-          </a:xfrm>
-          <a:prstGeom prst="rect">
-            <a:avLst/>
-          </a:prstGeom>
-        </p:spPr>
-      </p:pic>
-    </p:spTree>
-    <p:extLst>
-      <p:ext uri="{BB962C8B-B14F-4D97-AF65-F5344CB8AC3E}">
-        <p14:creationId xmlns:p14="http://schemas.microsoft.com/office/powerpoint/2010/main" val="24590043"/>
-      </p:ext>
-    </p:extLst>
-  </p:cSld>
-  <p:clrMapOvr>
-    <a:masterClrMapping/>
-  </p:clrMapOvr>
-</p:sld>
-</file>
-
-<file path=ppt/slides/slide16.xml><?xml version="1.0" encoding="utf-8"?>
-<p:sld xmlns:a="http://schemas.openxmlformats.org/drawingml/2006/main" xmlns:r="http://schemas.openxmlformats.org/officeDocument/2006/relationships" xmlns:p="http://schemas.openxmlformats.org/presentationml/2006/main">
-  <p:cSld>
-    <p:spTree>
-      <p:nvGrpSpPr>
-        <p:cNvPr id="1" name=""/>
-        <p:cNvGrpSpPr/>
-        <p:nvPr/>
-      </p:nvGrpSpPr>
-      <p:grpSpPr>
-        <a:xfrm>
-          <a:off x="0" y="0"/>
-          <a:ext cx="0" cy="0"/>
-          <a:chOff x="0" y="0"/>
-          <a:chExt cx="0" cy="0"/>
-        </a:xfrm>
-      </p:grpSpPr>
-      <p:sp>
-        <p:nvSpPr>
-          <p:cNvPr id="2" name="Title 1">
-            <a:extLst>
-              <a:ext uri="{FF2B5EF4-FFF2-40B4-BE49-F238E27FC236}">
                 <a16:creationId xmlns:a16="http://schemas.microsoft.com/office/drawing/2014/main" id="{B8684E65-9272-6945-9928-8DDC1F33474D}"/>
               </a:ext>
             </a:extLst>
@@ -8433,7 +8968,7 @@
                   <a:schemeClr val="tx2"/>
                 </a:solidFill>
                 <a:effectLst/>
-                <a:latin typeface="Consolas" panose="020B0609020204030204" pitchFamily="49" charset="0"/>
+                <a:latin typeface="Futura Md BT" panose="020B0602020204020303"/>
               </a:rPr>
               <a:t>Surprise! Explainable machine learning with </a:t>
             </a:r>
@@ -8443,7 +8978,7 @@
                   <a:schemeClr val="tx2"/>
                 </a:solidFill>
                 <a:effectLst/>
-                <a:latin typeface="Consolas" panose="020B0609020204030204" pitchFamily="49" charset="0"/>
+                <a:latin typeface="Futura Md BT" panose="020B0602020204020303"/>
               </a:rPr>
               <a:t>explainerdashboard</a:t>
             </a:r>
@@ -8506,7 +9041,7 @@
 </p:sld>
 </file>
 
-<file path=ppt/slides/slide17.xml><?xml version="1.0" encoding="utf-8"?>
+<file path=ppt/slides/slide16.xml><?xml version="1.0" encoding="utf-8"?>
 <p:sld xmlns:a="http://schemas.openxmlformats.org/drawingml/2006/main" xmlns:r="http://schemas.openxmlformats.org/officeDocument/2006/relationships" xmlns:p="http://schemas.openxmlformats.org/presentationml/2006/main">
   <p:cSld>
     <p:spTree>
@@ -8661,7 +9196,7 @@
           </p:nvPr>
         </p:nvPicPr>
         <p:blipFill>
-          <a:blip r:embed="rId2"/>
+          <a:blip r:embed="rId3"/>
           <a:stretch>
             <a:fillRect/>
           </a:stretch>
@@ -8764,15 +9299,7 @@
             </a:r>
             <a:r>
               <a:rPr lang="en-US" dirty="0"/>
-              <a:t> csv file that contains details about popular songs (</a:t>
-            </a:r>
-            <a:r>
-              <a:rPr lang="en-US" dirty="0" err="1"/>
-              <a:t>speechiness</a:t>
-            </a:r>
-            <a:r>
-              <a:rPr lang="en-US" dirty="0"/>
-              <a:t>, tempo, song name </a:t>
+              <a:t> csv file that contains details about popular songs (speechiness, tempo, song name </a:t>
             </a:r>
             <a:r>
               <a:rPr lang="en-US" dirty="0" err="1"/>
@@ -8780,13 +9307,13 @@
             </a:r>
             <a:r>
               <a:rPr lang="en-US" dirty="0"/>
-              <a:t>)</a:t>
+              <a:t>) (100 rows &amp; 14 columns)</a:t>
             </a:r>
           </a:p>
           <a:p>
             <a:r>
               <a:rPr lang="en-US" dirty="0"/>
-              <a:t>The second file contains a list of 2+ million songs collected over the year 2017. It also contains Position, number of streams, date, and region.</a:t>
+              <a:t>The second file contains a list of 2+ million songs collected over the year 2017 &amp; 2018. It also contains Position, number of streams, date, and region. (72400 &amp; 7 columns)</a:t>
             </a:r>
           </a:p>
           <a:p>
@@ -8806,31 +9333,6 @@
               <a:rPr lang="en-US" dirty="0"/>
               <a:t>For this project we only use region: USA and Year: 2017</a:t>
             </a:r>
-          </a:p>
-        </p:txBody>
-      </p:sp>
-      <p:sp>
-        <p:nvSpPr>
-          <p:cNvPr id="4" name="Text Placeholder 3">
-            <a:extLst>
-              <a:ext uri="{FF2B5EF4-FFF2-40B4-BE49-F238E27FC236}">
-                <a16:creationId xmlns:a16="http://schemas.microsoft.com/office/drawing/2014/main" id="{763D938D-8B54-3746-A0C6-B79655894B19}"/>
-              </a:ext>
-            </a:extLst>
-          </p:cNvPr>
-          <p:cNvSpPr>
-            <a:spLocks noGrp="1"/>
-          </p:cNvSpPr>
-          <p:nvPr>
-            <p:ph type="body" idx="11"/>
-          </p:nvPr>
-        </p:nvSpPr>
-        <p:spPr/>
-        <p:txBody>
-          <a:bodyPr/>
-          <a:lstStyle/>
-          <a:p>
-            <a:endParaRPr lang="en-US" dirty="0"/>
           </a:p>
         </p:txBody>
       </p:sp>
@@ -9081,7 +9583,7 @@
           <p:nvPr/>
         </p:nvPicPr>
         <p:blipFill>
-          <a:blip r:embed="rId2"/>
+          <a:blip r:embed="rId3"/>
           <a:stretch>
             <a:fillRect/>
           </a:stretch>
@@ -9263,7 +9765,7 @@
           <p:nvPr/>
         </p:nvPicPr>
         <p:blipFill>
-          <a:blip r:embed="rId2"/>
+          <a:blip r:embed="rId3"/>
           <a:stretch>
             <a:fillRect/>
           </a:stretch>
@@ -9482,7 +9984,7 @@
           <p:nvPr/>
         </p:nvPicPr>
         <p:blipFill>
-          <a:blip r:embed="rId2"/>
+          <a:blip r:embed="rId3"/>
           <a:stretch>
             <a:fillRect/>
           </a:stretch>
@@ -9532,7 +10034,7 @@
           <p:cNvPr id="2" name="Title 1">
             <a:extLst>
               <a:ext uri="{FF2B5EF4-FFF2-40B4-BE49-F238E27FC236}">
-                <a16:creationId xmlns:a16="http://schemas.microsoft.com/office/drawing/2014/main" id="{D75A4DC4-B69B-DC4C-A6FA-BC4335D7B9E5}"/>
+                <a16:creationId xmlns:a16="http://schemas.microsoft.com/office/drawing/2014/main" id="{7ACA722E-133A-C14E-B940-93B32C189F31}"/>
               </a:ext>
             </a:extLst>
           </p:cNvPr>
@@ -9545,136 +10047,191 @@
         </p:nvSpPr>
         <p:spPr/>
         <p:txBody>
-          <a:bodyPr>
-            <a:normAutofit fontScale="90000"/>
+          <a:bodyPr/>
+          <a:lstStyle/>
+          <a:p>
+            <a:r>
+              <a:rPr lang="en-US" dirty="0"/>
+              <a:t>Model Selection</a:t>
+            </a:r>
+          </a:p>
+        </p:txBody>
+      </p:sp>
+      <p:pic>
+        <p:nvPicPr>
+          <p:cNvPr id="5" name="Picture 4" descr="Graphical user interface, application&#10;&#10;Description automatically generated">
+            <a:extLst>
+              <a:ext uri="{FF2B5EF4-FFF2-40B4-BE49-F238E27FC236}">
+                <a16:creationId xmlns:a16="http://schemas.microsoft.com/office/drawing/2014/main" id="{88B329F6-A034-3128-52AB-F6E4E0A70503}"/>
+              </a:ext>
+            </a:extLst>
+          </p:cNvPr>
+          <p:cNvPicPr>
+            <a:picLocks noChangeAspect="1"/>
+          </p:cNvPicPr>
+          <p:nvPr/>
+        </p:nvPicPr>
+        <p:blipFill>
+          <a:blip r:embed="rId3"/>
+          <a:stretch>
+            <a:fillRect/>
+          </a:stretch>
+        </p:blipFill>
+        <p:spPr>
+          <a:xfrm>
+            <a:off x="6645468" y="2143734"/>
+            <a:ext cx="3000794" cy="4182059"/>
+          </a:xfrm>
+          <a:prstGeom prst="rect">
+            <a:avLst/>
+          </a:prstGeom>
+        </p:spPr>
+      </p:pic>
+      <p:sp>
+        <p:nvSpPr>
+          <p:cNvPr id="6" name="TextBox 5">
+            <a:extLst>
+              <a:ext uri="{FF2B5EF4-FFF2-40B4-BE49-F238E27FC236}">
+                <a16:creationId xmlns:a16="http://schemas.microsoft.com/office/drawing/2014/main" id="{C845E63C-3703-1D7C-4A11-4A093487635E}"/>
+              </a:ext>
+            </a:extLst>
+          </p:cNvPr>
+          <p:cNvSpPr txBox="1"/>
+          <p:nvPr/>
+        </p:nvSpPr>
+        <p:spPr>
+          <a:xfrm>
+            <a:off x="541107" y="1879041"/>
+            <a:ext cx="4412730" cy="1938992"/>
+          </a:xfrm>
+          <a:prstGeom prst="rect">
+            <a:avLst/>
+          </a:prstGeom>
+          <a:noFill/>
+        </p:spPr>
+        <p:txBody>
+          <a:bodyPr wrap="square" rtlCol="0">
+            <a:spAutoFit/>
           </a:bodyPr>
           <a:lstStyle/>
           <a:p>
             <a:r>
-              <a:rPr lang="en-US" dirty="0"/>
-              <a:t>Model Selection – Regression Techniques</a:t>
+              <a:rPr lang="en-US" sz="2400" dirty="0">
+                <a:latin typeface="Futura Md BT" panose="020B0602020204020303"/>
+              </a:rPr>
+              <a:t>For every model listed, a dataframe of feature importance with a bar graph and table entry is shown</a:t>
             </a:r>
           </a:p>
         </p:txBody>
       </p:sp>
-      <p:sp>
-        <p:nvSpPr>
-          <p:cNvPr id="3" name="Text Placeholder 2">
-            <a:extLst>
-              <a:ext uri="{FF2B5EF4-FFF2-40B4-BE49-F238E27FC236}">
-                <a16:creationId xmlns:a16="http://schemas.microsoft.com/office/drawing/2014/main" id="{63E99C7E-22E8-E643-AEFF-FD88DD2D989D}"/>
-              </a:ext>
-            </a:extLst>
-          </p:cNvPr>
-          <p:cNvSpPr>
-            <a:spLocks noGrp="1"/>
-          </p:cNvSpPr>
-          <p:nvPr>
-            <p:ph type="body" idx="1"/>
-          </p:nvPr>
-        </p:nvSpPr>
-        <p:spPr>
-          <a:xfrm>
-            <a:off x="3530235" y="2070938"/>
-            <a:ext cx="5131529" cy="4079696"/>
-          </a:xfrm>
+      <p:pic>
+        <p:nvPicPr>
+          <p:cNvPr id="8" name="Picture 7" descr="Graphical user interface, application&#10;&#10;Description automatically generated">
+            <a:extLst>
+              <a:ext uri="{FF2B5EF4-FFF2-40B4-BE49-F238E27FC236}">
+                <a16:creationId xmlns:a16="http://schemas.microsoft.com/office/drawing/2014/main" id="{FD035326-5433-CDC2-40B5-3F981CB478E8}"/>
+              </a:ext>
+            </a:extLst>
+          </p:cNvPr>
+          <p:cNvPicPr>
+            <a:picLocks noChangeAspect="1"/>
+          </p:cNvPicPr>
+          <p:nvPr/>
+        </p:nvPicPr>
+        <p:blipFill>
+          <a:blip r:embed="rId4"/>
+          <a:stretch>
+            <a:fillRect/>
+          </a:stretch>
+        </p:blipFill>
+        <p:spPr>
+          <a:xfrm>
+            <a:off x="218255" y="4501911"/>
+            <a:ext cx="5877745" cy="2086266"/>
+          </a:xfrm>
+          <a:prstGeom prst="rect">
+            <a:avLst/>
+          </a:prstGeom>
+        </p:spPr>
+      </p:pic>
+      <p:sp>
+        <p:nvSpPr>
+          <p:cNvPr id="4" name="TextBox 3">
+            <a:extLst>
+              <a:ext uri="{FF2B5EF4-FFF2-40B4-BE49-F238E27FC236}">
+                <a16:creationId xmlns:a16="http://schemas.microsoft.com/office/drawing/2014/main" id="{57D4698B-F6DA-9709-68B5-FD261EC5B1BD}"/>
+              </a:ext>
+            </a:extLst>
+          </p:cNvPr>
+          <p:cNvSpPr txBox="1"/>
+          <p:nvPr/>
+        </p:nvSpPr>
+        <p:spPr>
+          <a:xfrm>
+            <a:off x="1958004" y="4063271"/>
+            <a:ext cx="2081433" cy="461665"/>
+          </a:xfrm>
+          <a:prstGeom prst="rect">
+            <a:avLst/>
+          </a:prstGeom>
+          <a:noFill/>
         </p:spPr>
         <p:txBody>
-          <a:bodyPr/>
+          <a:bodyPr wrap="square" rtlCol="0">
+            <a:spAutoFit/>
+          </a:bodyPr>
           <a:lstStyle/>
           <a:p>
             <a:r>
-              <a:rPr lang="en-US" b="0" dirty="0">
-                <a:solidFill>
-                  <a:schemeClr val="tx2"/>
-                </a:solidFill>
-                <a:effectLst/>
-                <a:latin typeface="Consolas" panose="020B0609020204030204" pitchFamily="49" charset="0"/>
+              <a:rPr lang="en-US" sz="2400" dirty="0">
+                <a:latin typeface="Futura Md BT" panose="020B0602020204020303"/>
               </a:rPr>
-              <a:t>* Linear Regression</a:t>
-            </a:r>
-          </a:p>
-          <a:p>
-            <a:r>
-              <a:rPr lang="en-US" b="0" dirty="0">
-                <a:solidFill>
-                  <a:schemeClr val="tx2"/>
-                </a:solidFill>
-                <a:effectLst/>
-                <a:latin typeface="Consolas" panose="020B0609020204030204" pitchFamily="49" charset="0"/>
+              <a:t>Final Results</a:t>
+            </a:r>
+          </a:p>
+        </p:txBody>
+      </p:sp>
+      <p:sp>
+        <p:nvSpPr>
+          <p:cNvPr id="7" name="TextBox 6">
+            <a:extLst>
+              <a:ext uri="{FF2B5EF4-FFF2-40B4-BE49-F238E27FC236}">
+                <a16:creationId xmlns:a16="http://schemas.microsoft.com/office/drawing/2014/main" id="{72669763-C55B-29DD-EDAE-52EEB5412DE4}"/>
+              </a:ext>
+            </a:extLst>
+          </p:cNvPr>
+          <p:cNvSpPr txBox="1"/>
+          <p:nvPr/>
+        </p:nvSpPr>
+        <p:spPr>
+          <a:xfrm>
+            <a:off x="9646262" y="2210851"/>
+            <a:ext cx="2451953" cy="830997"/>
+          </a:xfrm>
+          <a:prstGeom prst="rect">
+            <a:avLst/>
+          </a:prstGeom>
+          <a:noFill/>
+        </p:spPr>
+        <p:txBody>
+          <a:bodyPr wrap="square" rtlCol="0">
+            <a:spAutoFit/>
+          </a:bodyPr>
+          <a:lstStyle/>
+          <a:p>
+            <a:r>
+              <a:rPr lang="en-US" sz="2400" dirty="0">
+                <a:latin typeface="Futura Md BT" panose="020B0602020204020303"/>
               </a:rPr>
-              <a:t>* Decision Tree Regressor</a:t>
-            </a:r>
-          </a:p>
-          <a:p>
-            <a:r>
-              <a:rPr lang="en-US" b="0" dirty="0">
-                <a:solidFill>
-                  <a:schemeClr val="tx2"/>
-                </a:solidFill>
-                <a:effectLst/>
-                <a:latin typeface="Consolas" panose="020B0609020204030204" pitchFamily="49" charset="0"/>
-              </a:rPr>
-              <a:t>* Random Forest Regressor</a:t>
-            </a:r>
-          </a:p>
-          <a:p>
-            <a:r>
-              <a:rPr lang="en-US" b="0" dirty="0">
-                <a:solidFill>
-                  <a:schemeClr val="tx2"/>
-                </a:solidFill>
-                <a:effectLst/>
-                <a:latin typeface="Consolas" panose="020B0609020204030204" pitchFamily="49" charset="0"/>
-              </a:rPr>
-              <a:t>* SVM-R</a:t>
-            </a:r>
-          </a:p>
-          <a:p>
-            <a:r>
-              <a:rPr lang="en-US" b="0" dirty="0">
-                <a:solidFill>
-                  <a:schemeClr val="tx2"/>
-                </a:solidFill>
-                <a:effectLst/>
-                <a:latin typeface="Consolas" panose="020B0609020204030204" pitchFamily="49" charset="0"/>
-              </a:rPr>
-              <a:t>* Bagging Regressor</a:t>
-            </a:r>
-          </a:p>
-          <a:p>
-            <a:r>
-              <a:rPr lang="en-US" b="0" dirty="0">
-                <a:solidFill>
-                  <a:schemeClr val="tx2"/>
-                </a:solidFill>
-                <a:effectLst/>
-                <a:latin typeface="Consolas" panose="020B0609020204030204" pitchFamily="49" charset="0"/>
-              </a:rPr>
-              <a:t>* Ridge Regressor</a:t>
-            </a:r>
-          </a:p>
-          <a:p>
-            <a:r>
-              <a:rPr lang="en-US" b="0" dirty="0">
-                <a:solidFill>
-                  <a:schemeClr val="tx2"/>
-                </a:solidFill>
-                <a:effectLst/>
-                <a:latin typeface="Consolas" panose="020B0609020204030204" pitchFamily="49" charset="0"/>
-              </a:rPr>
-              <a:t>* OLS Summary Report</a:t>
-            </a:r>
-          </a:p>
-          <a:p>
-            <a:endParaRPr lang="en-US" dirty="0"/>
+              <a:t>Sample model output</a:t>
+            </a:r>
           </a:p>
         </p:txBody>
       </p:sp>
     </p:spTree>
     <p:extLst>
       <p:ext uri="{BB962C8B-B14F-4D97-AF65-F5344CB8AC3E}">
-        <p14:creationId xmlns:p14="http://schemas.microsoft.com/office/powerpoint/2010/main" val="2054809379"/>
+        <p14:creationId xmlns:p14="http://schemas.microsoft.com/office/powerpoint/2010/main" val="1233587953"/>
       </p:ext>
     </p:extLst>
   </p:cSld>
@@ -9687,6 +10244,14 @@
 <file path=ppt/slides/slide9.xml><?xml version="1.0" encoding="utf-8"?>
 <p:sld xmlns:a="http://schemas.openxmlformats.org/drawingml/2006/main" xmlns:r="http://schemas.openxmlformats.org/officeDocument/2006/relationships" xmlns:p="http://schemas.openxmlformats.org/presentationml/2006/main">
   <p:cSld>
+    <p:bg>
+      <p:bgPr>
+        <a:solidFill>
+          <a:schemeClr val="bg1"/>
+        </a:solidFill>
+        <a:effectLst/>
+      </p:bgPr>
+    </p:bg>
     <p:spTree>
       <p:nvGrpSpPr>
         <p:cNvPr id="1" name=""/>
@@ -9703,10 +10268,76 @@
       </p:grpSpPr>
       <p:sp>
         <p:nvSpPr>
+          <p:cNvPr id="11" name="Down Arrow 7">
+            <a:extLst>
+              <a:ext uri="{FF2B5EF4-FFF2-40B4-BE49-F238E27FC236}">
+                <a16:creationId xmlns:a16="http://schemas.microsoft.com/office/drawing/2014/main" id="{D4771268-CB57-404A-9271-370EB28F6090}"/>
+              </a:ext>
+              <a:ext uri="{C183D7F6-B498-43B3-948B-1728B52AA6E4}">
+                <adec:decorative xmlns:adec="http://schemas.microsoft.com/office/drawing/2017/decorative" val="1"/>
+              </a:ext>
+            </a:extLst>
+          </p:cNvPr>
+          <p:cNvSpPr>
+            <a:spLocks noGrp="1" noRot="1" noChangeAspect="1" noMove="1" noResize="1" noEditPoints="1" noAdjustHandles="1" noChangeArrowheads="1" noChangeShapeType="1" noTextEdit="1"/>
+          </p:cNvSpPr>
+          <p:nvPr>
+            <p:extLst>
+              <p:ext uri="{386F3935-93C4-4BCD-93E2-E3B085C9AB24}">
+                <p16:designElem xmlns:p16="http://schemas.microsoft.com/office/powerpoint/2015/main" val="1"/>
+              </p:ext>
+            </p:extLst>
+          </p:nvPr>
+        </p:nvSpPr>
+        <p:spPr>
+          <a:xfrm rot="16200000">
+            <a:off x="800100" y="1491343"/>
+            <a:ext cx="3333749" cy="3499103"/>
+          </a:xfrm>
+          <a:prstGeom prst="downArrow">
+            <a:avLst>
+              <a:gd name="adj1" fmla="val 100000"/>
+              <a:gd name="adj2" fmla="val 15788"/>
+            </a:avLst>
+          </a:prstGeom>
+          <a:solidFill>
+            <a:srgbClr val="404040"/>
+          </a:solidFill>
+          <a:ln w="53975">
+            <a:noFill/>
+          </a:ln>
+        </p:spPr>
+        <p:style>
+          <a:lnRef idx="2">
+            <a:schemeClr val="accent1">
+              <a:shade val="50000"/>
+            </a:schemeClr>
+          </a:lnRef>
+          <a:fillRef idx="1">
+            <a:schemeClr val="accent1"/>
+          </a:fillRef>
+          <a:effectRef idx="0">
+            <a:schemeClr val="accent1"/>
+          </a:effectRef>
+          <a:fontRef idx="minor">
+            <a:schemeClr val="lt1"/>
+          </a:fontRef>
+        </p:style>
+        <p:txBody>
+          <a:bodyPr rtlCol="0" anchor="ctr"/>
+          <a:lstStyle/>
+          <a:p>
+            <a:pPr algn="ctr"/>
+            <a:endParaRPr lang="en-US"/>
+          </a:p>
+        </p:txBody>
+      </p:sp>
+      <p:sp>
+        <p:nvSpPr>
           <p:cNvPr id="2" name="Title 1">
             <a:extLst>
               <a:ext uri="{FF2B5EF4-FFF2-40B4-BE49-F238E27FC236}">
-                <a16:creationId xmlns:a16="http://schemas.microsoft.com/office/drawing/2014/main" id="{7ACA722E-133A-C14E-B940-93B32C189F31}"/>
+                <a16:creationId xmlns:a16="http://schemas.microsoft.com/office/drawing/2014/main" id="{F6F8B694-0C90-CE32-B027-0FDD7110C93A}"/>
               </a:ext>
             </a:extLst>
           </p:cNvPr>
@@ -9717,24 +10348,44 @@
             <p:ph type="title"/>
           </p:nvPr>
         </p:nvSpPr>
-        <p:spPr/>
+        <p:spPr>
+          <a:xfrm>
+            <a:off x="1028700" y="1967266"/>
+            <a:ext cx="2628900" cy="2547257"/>
+          </a:xfrm>
+          <a:noFill/>
+        </p:spPr>
         <p:txBody>
-          <a:bodyPr/>
+          <a:bodyPr vert="horz" lIns="91440" tIns="45720" rIns="91440" bIns="45720" rtlCol="0" anchor="ctr">
+            <a:normAutofit/>
+          </a:bodyPr>
           <a:lstStyle/>
           <a:p>
-            <a:r>
-              <a:rPr lang="en-US" dirty="0"/>
-              <a:t>Model Selection</a:t>
+            <a:pPr algn="ctr">
+              <a:lnSpc>
+                <a:spcPct val="90000"/>
+              </a:lnSpc>
+            </a:pPr>
+            <a:r>
+              <a:rPr lang="en-US" sz="3600" kern="1200">
+                <a:solidFill>
+                  <a:srgbClr val="FFFFFF"/>
+                </a:solidFill>
+                <a:latin typeface="+mj-lt"/>
+                <a:ea typeface="+mj-ea"/>
+                <a:cs typeface="+mj-cs"/>
+              </a:rPr>
+              <a:t>Model Selection Continued</a:t>
             </a:r>
           </a:p>
         </p:txBody>
       </p:sp>
       <p:pic>
         <p:nvPicPr>
-          <p:cNvPr id="5" name="Picture 4" descr="Graphical user interface, application&#10;&#10;Description automatically generated">
-            <a:extLst>
-              <a:ext uri="{FF2B5EF4-FFF2-40B4-BE49-F238E27FC236}">
-                <a16:creationId xmlns:a16="http://schemas.microsoft.com/office/drawing/2014/main" id="{88B329F6-A034-3128-52AB-F6E4E0A70503}"/>
+          <p:cNvPr id="6" name="Picture 5" descr="Chart, bar chart, histogram&#10;&#10;Description automatically generated">
+            <a:extLst>
+              <a:ext uri="{FF2B5EF4-FFF2-40B4-BE49-F238E27FC236}">
+                <a16:creationId xmlns:a16="http://schemas.microsoft.com/office/drawing/2014/main" id="{07ED4E35-E93B-52B8-260E-96E996BE111C}"/>
               </a:ext>
             </a:extLst>
           </p:cNvPr>
@@ -9751,75 +10402,8 @@
         </p:blipFill>
         <p:spPr>
           <a:xfrm>
-            <a:off x="6645468" y="2143734"/>
-            <a:ext cx="3000794" cy="4182059"/>
-          </a:xfrm>
-          <a:prstGeom prst="rect">
-            <a:avLst/>
-          </a:prstGeom>
-        </p:spPr>
-      </p:pic>
-      <p:sp>
-        <p:nvSpPr>
-          <p:cNvPr id="6" name="TextBox 5">
-            <a:extLst>
-              <a:ext uri="{FF2B5EF4-FFF2-40B4-BE49-F238E27FC236}">
-                <a16:creationId xmlns:a16="http://schemas.microsoft.com/office/drawing/2014/main" id="{C845E63C-3703-1D7C-4A11-4A093487635E}"/>
-              </a:ext>
-            </a:extLst>
-          </p:cNvPr>
-          <p:cNvSpPr txBox="1"/>
-          <p:nvPr/>
-        </p:nvSpPr>
-        <p:spPr>
-          <a:xfrm>
-            <a:off x="711929" y="2321169"/>
-            <a:ext cx="4412730" cy="1569660"/>
-          </a:xfrm>
-          <a:prstGeom prst="rect">
-            <a:avLst/>
-          </a:prstGeom>
-          <a:noFill/>
-        </p:spPr>
-        <p:txBody>
-          <a:bodyPr wrap="square" rtlCol="0">
-            <a:spAutoFit/>
-          </a:bodyPr>
-          <a:lstStyle/>
-          <a:p>
-            <a:r>
-              <a:rPr lang="en-US" sz="2400" dirty="0">
-                <a:latin typeface="Futura Md BT" panose="020B0602020204020303"/>
-              </a:rPr>
-              <a:t>For every model listed, a dataframe of feature importance, bar graph, table entry is shown</a:t>
-            </a:r>
-          </a:p>
-        </p:txBody>
-      </p:sp>
-      <p:pic>
-        <p:nvPicPr>
-          <p:cNvPr id="8" name="Picture 7" descr="Graphical user interface, application&#10;&#10;Description automatically generated">
-            <a:extLst>
-              <a:ext uri="{FF2B5EF4-FFF2-40B4-BE49-F238E27FC236}">
-                <a16:creationId xmlns:a16="http://schemas.microsoft.com/office/drawing/2014/main" id="{FD035326-5433-CDC2-40B5-3F981CB478E8}"/>
-              </a:ext>
-            </a:extLst>
-          </p:cNvPr>
-          <p:cNvPicPr>
-            <a:picLocks noChangeAspect="1"/>
-          </p:cNvPicPr>
-          <p:nvPr/>
-        </p:nvPicPr>
-        <p:blipFill>
-          <a:blip r:embed="rId3"/>
-          <a:stretch>
-            <a:fillRect/>
-          </a:stretch>
-        </p:blipFill>
-        <p:spPr>
-          <a:xfrm>
-            <a:off x="218255" y="4234764"/>
-            <a:ext cx="5877745" cy="2086266"/>
+            <a:off x="5244113" y="854109"/>
+            <a:ext cx="6947887" cy="5888334"/>
           </a:xfrm>
           <a:prstGeom prst="rect">
             <a:avLst/>
@@ -9829,7 +10413,7 @@
     </p:spTree>
     <p:extLst>
       <p:ext uri="{BB962C8B-B14F-4D97-AF65-F5344CB8AC3E}">
-        <p14:creationId xmlns:p14="http://schemas.microsoft.com/office/powerpoint/2010/main" val="1233587953"/>
+        <p14:creationId xmlns:p14="http://schemas.microsoft.com/office/powerpoint/2010/main" val="2089948446"/>
       </p:ext>
     </p:extLst>
   </p:cSld>

</xml_diff>